<commit_message>
Update 0608 project06 - 파워포인트 - 서희.pptx
</commit_message>
<xml_diff>
--- a/0 발표용 파워포인트/0608 5차발표/0608 project06 - 파워포인트 - 서희.pptx
+++ b/0 발표용 파워포인트/0608 5차발표/0608 project06 - 파워포인트 - 서희.pptx
@@ -5,7 +5,7 @@
     <p:sldMasterId id="2147483648" r:id="rId1"/>
   </p:sldMasterIdLst>
   <p:notesMasterIdLst>
-    <p:notesMasterId r:id="rId27"/>
+    <p:notesMasterId r:id="rId29"/>
   </p:notesMasterIdLst>
   <p:sldIdLst>
     <p:sldId id="256" r:id="rId2"/>
@@ -33,6 +33,8 @@
     <p:sldId id="264" r:id="rId24"/>
     <p:sldId id="279" r:id="rId25"/>
     <p:sldId id="280" r:id="rId26"/>
+    <p:sldId id="285" r:id="rId27"/>
+    <p:sldId id="286" r:id="rId28"/>
   </p:sldIdLst>
   <p:sldSz cx="12192000" cy="6858000"/>
   <p:notesSz cx="6858000" cy="9144000"/>
@@ -133,7 +135,7 @@
   </p:defaultTextStyle>
   <p:extLst>
     <p:ext uri="{EFAFB233-063F-42B5-8137-9DF3F51BA10A}">
-      <p15:sldGuideLst xmlns="" xmlns:p15="http://schemas.microsoft.com/office/powerpoint/2012/main">
+      <p15:sldGuideLst xmlns:p15="http://schemas.microsoft.com/office/powerpoint/2012/main" xmlns="">
         <p15:guide id="1" orient="horz" pos="2160">
           <p15:clr>
             <a:srgbClr val="A4A3A4"/>
@@ -233,7 +235,7 @@
             <a:fld id="{EFE7F2A0-C7D9-4DBD-AE3B-C1A712DCE501}" type="datetimeFigureOut">
               <a:rPr lang="ko-KR" altLang="en-US" smtClean="0"/>
               <a:pPr/>
-              <a:t>2020-06-04</a:t>
+              <a:t>2020-06-05</a:t>
             </a:fld>
             <a:endParaRPr lang="ko-KR" altLang="en-US"/>
           </a:p>
@@ -606,6 +608,115 @@
 </p:notes>
 </file>
 
+<file path=ppt/notesSlides/notesSlide2.xml><?xml version="1.0" encoding="utf-8"?>
+<p:notes xmlns:a="http://schemas.openxmlformats.org/drawingml/2006/main" xmlns:r="http://schemas.openxmlformats.org/officeDocument/2006/relationships" xmlns:p="http://schemas.openxmlformats.org/presentationml/2006/main" showMasterSp="0" showMasterPhAnim="0">
+  <p:cSld>
+    <p:spTree>
+      <p:nvGrpSpPr>
+        <p:cNvPr id="1" name="Shape 98"/>
+        <p:cNvGrpSpPr/>
+        <p:nvPr/>
+      </p:nvGrpSpPr>
+      <p:grpSpPr>
+        <a:xfrm>
+          <a:off x="0" y="0"/>
+          <a:ext cx="0" cy="0"/>
+          <a:chOff x="0" y="0"/>
+          <a:chExt cx="0" cy="0"/>
+        </a:xfrm>
+      </p:grpSpPr>
+      <p:sp>
+        <p:nvSpPr>
+          <p:cNvPr id="99" name="Google Shape;99;g35ed75ccf_015:notes"/>
+          <p:cNvSpPr>
+            <a:spLocks noGrp="1" noRot="1" noChangeAspect="1"/>
+          </p:cNvSpPr>
+          <p:nvPr>
+            <p:ph type="sldImg" idx="2"/>
+          </p:nvPr>
+        </p:nvSpPr>
+        <p:spPr>
+          <a:xfrm>
+            <a:off x="381000" y="685800"/>
+            <a:ext cx="6096000" cy="3429000"/>
+          </a:xfrm>
+          <a:custGeom>
+            <a:avLst/>
+            <a:gdLst/>
+            <a:ahLst/>
+            <a:cxnLst/>
+            <a:rect l="l" t="t" r="r" b="b"/>
+            <a:pathLst>
+              <a:path w="120000" h="120000" extrusionOk="0">
+                <a:moveTo>
+                  <a:pt x="0" y="0"/>
+                </a:moveTo>
+                <a:lnTo>
+                  <a:pt x="120000" y="0"/>
+                </a:lnTo>
+                <a:lnTo>
+                  <a:pt x="120000" y="120000"/>
+                </a:lnTo>
+                <a:lnTo>
+                  <a:pt x="0" y="120000"/>
+                </a:lnTo>
+                <a:close/>
+              </a:path>
+            </a:pathLst>
+          </a:custGeom>
+        </p:spPr>
+      </p:sp>
+      <p:sp>
+        <p:nvSpPr>
+          <p:cNvPr id="100" name="Google Shape;100;g35ed75ccf_015:notes"/>
+          <p:cNvSpPr txBox="1">
+            <a:spLocks noGrp="1"/>
+          </p:cNvSpPr>
+          <p:nvPr>
+            <p:ph type="body" idx="1"/>
+          </p:nvPr>
+        </p:nvSpPr>
+        <p:spPr>
+          <a:xfrm>
+            <a:off x="685800" y="4343400"/>
+            <a:ext cx="5486400" cy="4114800"/>
+          </a:xfrm>
+          <a:prstGeom prst="rect">
+            <a:avLst/>
+          </a:prstGeom>
+        </p:spPr>
+        <p:txBody>
+          <a:bodyPr spcFirstLastPara="1" wrap="square" lIns="91425" tIns="91425" rIns="91425" bIns="91425" anchor="t" anchorCtr="0">
+            <a:noAutofit/>
+          </a:bodyPr>
+          <a:lstStyle/>
+          <a:p>
+            <a:pPr marL="0" lvl="0" indent="0" algn="l" rtl="0">
+              <a:spcBef>
+                <a:spcPts val="0"/>
+              </a:spcBef>
+              <a:spcAft>
+                <a:spcPts val="0"/>
+              </a:spcAft>
+              <a:buNone/>
+            </a:pPr>
+            <a:endParaRPr/>
+          </a:p>
+        </p:txBody>
+      </p:sp>
+    </p:spTree>
+    <p:extLst>
+      <p:ext uri="{BB962C8B-B14F-4D97-AF65-F5344CB8AC3E}">
+        <p14:creationId xmlns:p14="http://schemas.microsoft.com/office/powerpoint/2010/main" val="432122087"/>
+      </p:ext>
+    </p:extLst>
+  </p:cSld>
+  <p:clrMapOvr>
+    <a:masterClrMapping/>
+  </p:clrMapOvr>
+</p:notes>
+</file>
+
 <file path=ppt/slideLayouts/slideLayout1.xml><?xml version="1.0" encoding="utf-8"?>
 <p:sldLayout xmlns:a="http://schemas.openxmlformats.org/drawingml/2006/main" xmlns:r="http://schemas.openxmlformats.org/officeDocument/2006/relationships" xmlns:p="http://schemas.openxmlformats.org/presentationml/2006/main" type="title" preserve="1">
   <p:cSld name="제목 슬라이드">
@@ -738,7 +849,7 @@
             <a:fld id="{272C3D53-FEDF-49EC-8F65-FFFC138B637E}" type="datetimeFigureOut">
               <a:rPr lang="ko-KR" altLang="en-US" smtClean="0"/>
               <a:pPr/>
-              <a:t>2020-06-04</a:t>
+              <a:t>2020-06-05</a:t>
             </a:fld>
             <a:endParaRPr lang="ko-KR" altLang="en-US"/>
           </a:p>
@@ -910,7 +1021,7 @@
             <a:fld id="{272C3D53-FEDF-49EC-8F65-FFFC138B637E}" type="datetimeFigureOut">
               <a:rPr lang="ko-KR" altLang="en-US" smtClean="0"/>
               <a:pPr/>
-              <a:t>2020-06-04</a:t>
+              <a:t>2020-06-05</a:t>
             </a:fld>
             <a:endParaRPr lang="ko-KR" altLang="en-US"/>
           </a:p>
@@ -1092,7 +1203,7 @@
             <a:fld id="{272C3D53-FEDF-49EC-8F65-FFFC138B637E}" type="datetimeFigureOut">
               <a:rPr lang="ko-KR" altLang="en-US" smtClean="0"/>
               <a:pPr/>
-              <a:t>2020-06-04</a:t>
+              <a:t>2020-06-05</a:t>
             </a:fld>
             <a:endParaRPr lang="ko-KR" altLang="en-US"/>
           </a:p>
@@ -1462,7 +1573,7 @@
             <a:fld id="{272C3D53-FEDF-49EC-8F65-FFFC138B637E}" type="datetimeFigureOut">
               <a:rPr lang="ko-KR" altLang="en-US" smtClean="0"/>
               <a:pPr/>
-              <a:t>2020-06-04</a:t>
+              <a:t>2020-06-05</a:t>
             </a:fld>
             <a:endParaRPr lang="ko-KR" altLang="en-US"/>
           </a:p>
@@ -1710,7 +1821,7 @@
             <a:fld id="{272C3D53-FEDF-49EC-8F65-FFFC138B637E}" type="datetimeFigureOut">
               <a:rPr lang="ko-KR" altLang="en-US" smtClean="0"/>
               <a:pPr/>
-              <a:t>2020-06-04</a:t>
+              <a:t>2020-06-05</a:t>
             </a:fld>
             <a:endParaRPr lang="ko-KR" altLang="en-US"/>
           </a:p>
@@ -1944,7 +2055,7 @@
             <a:fld id="{272C3D53-FEDF-49EC-8F65-FFFC138B637E}" type="datetimeFigureOut">
               <a:rPr lang="ko-KR" altLang="en-US" smtClean="0"/>
               <a:pPr/>
-              <a:t>2020-06-04</a:t>
+              <a:t>2020-06-05</a:t>
             </a:fld>
             <a:endParaRPr lang="ko-KR" altLang="en-US"/>
           </a:p>
@@ -2313,7 +2424,7 @@
             <a:fld id="{272C3D53-FEDF-49EC-8F65-FFFC138B637E}" type="datetimeFigureOut">
               <a:rPr lang="ko-KR" altLang="en-US" smtClean="0"/>
               <a:pPr/>
-              <a:t>2020-06-04</a:t>
+              <a:t>2020-06-05</a:t>
             </a:fld>
             <a:endParaRPr lang="ko-KR" altLang="en-US"/>
           </a:p>
@@ -2433,7 +2544,7 @@
             <a:fld id="{272C3D53-FEDF-49EC-8F65-FFFC138B637E}" type="datetimeFigureOut">
               <a:rPr lang="ko-KR" altLang="en-US" smtClean="0"/>
               <a:pPr/>
-              <a:t>2020-06-04</a:t>
+              <a:t>2020-06-05</a:t>
             </a:fld>
             <a:endParaRPr lang="ko-KR" altLang="en-US"/>
           </a:p>
@@ -2530,7 +2641,7 @@
             <a:fld id="{272C3D53-FEDF-49EC-8F65-FFFC138B637E}" type="datetimeFigureOut">
               <a:rPr lang="ko-KR" altLang="en-US" smtClean="0"/>
               <a:pPr/>
-              <a:t>2020-06-04</a:t>
+              <a:t>2020-06-05</a:t>
             </a:fld>
             <a:endParaRPr lang="ko-KR" altLang="en-US"/>
           </a:p>
@@ -2809,7 +2920,7 @@
             <a:fld id="{272C3D53-FEDF-49EC-8F65-FFFC138B637E}" type="datetimeFigureOut">
               <a:rPr lang="ko-KR" altLang="en-US" smtClean="0"/>
               <a:pPr/>
-              <a:t>2020-06-04</a:t>
+              <a:t>2020-06-05</a:t>
             </a:fld>
             <a:endParaRPr lang="ko-KR" altLang="en-US"/>
           </a:p>
@@ -3064,7 +3175,7 @@
             <a:fld id="{272C3D53-FEDF-49EC-8F65-FFFC138B637E}" type="datetimeFigureOut">
               <a:rPr lang="ko-KR" altLang="en-US" smtClean="0"/>
               <a:pPr/>
-              <a:t>2020-06-04</a:t>
+              <a:t>2020-06-05</a:t>
             </a:fld>
             <a:endParaRPr lang="ko-KR" altLang="en-US"/>
           </a:p>
@@ -3279,7 +3390,7 @@
             <a:fld id="{272C3D53-FEDF-49EC-8F65-FFFC138B637E}" type="datetimeFigureOut">
               <a:rPr lang="ko-KR" altLang="en-US" smtClean="0"/>
               <a:pPr/>
-              <a:t>2020-06-04</a:t>
+              <a:t>2020-06-05</a:t>
             </a:fld>
             <a:endParaRPr lang="ko-KR" altLang="en-US"/>
           </a:p>
@@ -7107,7 +7218,7 @@
                 <a:gridCol w="2692879">
                   <a:extLst>
                     <a:ext uri="{9D8B030D-6E8A-4147-A177-3AD203B41FA5}">
-                      <a16:colId xmlns="" xmlns:a16="http://schemas.microsoft.com/office/drawing/2014/main" val="20000"/>
+                      <a16:colId xmlns:a16="http://schemas.microsoft.com/office/drawing/2014/main" xmlns="" val="20000"/>
                     </a:ext>
                   </a:extLst>
                 </a:gridCol>
@@ -7139,7 +7250,7 @@
                 </a:tc>
                 <a:extLst>
                   <a:ext uri="{0D108BD9-81ED-4DB2-BD59-A6C34878D82A}">
-                    <a16:rowId xmlns="" xmlns:a16="http://schemas.microsoft.com/office/drawing/2014/main" val="10000"/>
+                    <a16:rowId xmlns:a16="http://schemas.microsoft.com/office/drawing/2014/main" xmlns="" val="10000"/>
                   </a:ext>
                 </a:extLst>
               </a:tr>
@@ -7167,7 +7278,7 @@
                 </a:tc>
                 <a:extLst>
                   <a:ext uri="{0D108BD9-81ED-4DB2-BD59-A6C34878D82A}">
-                    <a16:rowId xmlns="" xmlns:a16="http://schemas.microsoft.com/office/drawing/2014/main" val="10001"/>
+                    <a16:rowId xmlns:a16="http://schemas.microsoft.com/office/drawing/2014/main" xmlns="" val="10001"/>
                   </a:ext>
                 </a:extLst>
               </a:tr>
@@ -7201,14 +7312,14 @@
                 <a:gridCol w="280507">
                   <a:extLst>
                     <a:ext uri="{9D8B030D-6E8A-4147-A177-3AD203B41FA5}">
-                      <a16:colId xmlns="" xmlns:a16="http://schemas.microsoft.com/office/drawing/2014/main" val="20000"/>
+                      <a16:colId xmlns:a16="http://schemas.microsoft.com/office/drawing/2014/main" xmlns="" val="20000"/>
                     </a:ext>
                   </a:extLst>
                 </a:gridCol>
                 <a:gridCol w="2407792">
                   <a:extLst>
                     <a:ext uri="{9D8B030D-6E8A-4147-A177-3AD203B41FA5}">
-                      <a16:colId xmlns="" xmlns:a16="http://schemas.microsoft.com/office/drawing/2014/main" val="20001"/>
+                      <a16:colId xmlns:a16="http://schemas.microsoft.com/office/drawing/2014/main" xmlns="" val="20001"/>
                     </a:ext>
                   </a:extLst>
                 </a:gridCol>
@@ -7270,7 +7381,7 @@
                 </a:tc>
                 <a:extLst>
                   <a:ext uri="{0D108BD9-81ED-4DB2-BD59-A6C34878D82A}">
-                    <a16:rowId xmlns="" xmlns:a16="http://schemas.microsoft.com/office/drawing/2014/main" val="10000"/>
+                    <a16:rowId xmlns:a16="http://schemas.microsoft.com/office/drawing/2014/main" xmlns="" val="10000"/>
                   </a:ext>
                 </a:extLst>
               </a:tr>
@@ -7380,7 +7491,7 @@
                 </a:tc>
                 <a:extLst>
                   <a:ext uri="{0D108BD9-81ED-4DB2-BD59-A6C34878D82A}">
-                    <a16:rowId xmlns="" xmlns:a16="http://schemas.microsoft.com/office/drawing/2014/main" val="10001"/>
+                    <a16:rowId xmlns:a16="http://schemas.microsoft.com/office/drawing/2014/main" xmlns="" val="10001"/>
                   </a:ext>
                 </a:extLst>
               </a:tr>
@@ -7514,7 +7625,7 @@
                 </a:tc>
                 <a:extLst>
                   <a:ext uri="{0D108BD9-81ED-4DB2-BD59-A6C34878D82A}">
-                    <a16:rowId xmlns="" xmlns:a16="http://schemas.microsoft.com/office/drawing/2014/main" val="10002"/>
+                    <a16:rowId xmlns:a16="http://schemas.microsoft.com/office/drawing/2014/main" xmlns="" val="10002"/>
                   </a:ext>
                 </a:extLst>
               </a:tr>
@@ -7612,7 +7723,7 @@
                 </a:tc>
                 <a:extLst>
                   <a:ext uri="{0D108BD9-81ED-4DB2-BD59-A6C34878D82A}">
-                    <a16:rowId xmlns="" xmlns:a16="http://schemas.microsoft.com/office/drawing/2014/main" val="10003"/>
+                    <a16:rowId xmlns:a16="http://schemas.microsoft.com/office/drawing/2014/main" xmlns="" val="10003"/>
                   </a:ext>
                 </a:extLst>
               </a:tr>
@@ -12331,7 +12442,7 @@
                 <a:gridCol w="2688299">
                   <a:extLst>
                     <a:ext uri="{9D8B030D-6E8A-4147-A177-3AD203B41FA5}">
-                      <a16:colId xmlns="" xmlns:a16="http://schemas.microsoft.com/office/drawing/2014/main" val="20000"/>
+                      <a16:colId xmlns:a16="http://schemas.microsoft.com/office/drawing/2014/main" xmlns="" val="20000"/>
                     </a:ext>
                   </a:extLst>
                 </a:gridCol>
@@ -12363,7 +12474,7 @@
                 </a:tc>
                 <a:extLst>
                   <a:ext uri="{0D108BD9-81ED-4DB2-BD59-A6C34878D82A}">
-                    <a16:rowId xmlns="" xmlns:a16="http://schemas.microsoft.com/office/drawing/2014/main" val="10000"/>
+                    <a16:rowId xmlns:a16="http://schemas.microsoft.com/office/drawing/2014/main" xmlns="" val="10000"/>
                   </a:ext>
                 </a:extLst>
               </a:tr>
@@ -12391,7 +12502,7 @@
                 </a:tc>
                 <a:extLst>
                   <a:ext uri="{0D108BD9-81ED-4DB2-BD59-A6C34878D82A}">
-                    <a16:rowId xmlns="" xmlns:a16="http://schemas.microsoft.com/office/drawing/2014/main" val="10001"/>
+                    <a16:rowId xmlns:a16="http://schemas.microsoft.com/office/drawing/2014/main" xmlns="" val="10001"/>
                   </a:ext>
                 </a:extLst>
               </a:tr>
@@ -12425,14 +12536,14 @@
                 <a:gridCol w="280507">
                   <a:extLst>
                     <a:ext uri="{9D8B030D-6E8A-4147-A177-3AD203B41FA5}">
-                      <a16:colId xmlns="" xmlns:a16="http://schemas.microsoft.com/office/drawing/2014/main" val="20000"/>
+                      <a16:colId xmlns:a16="http://schemas.microsoft.com/office/drawing/2014/main" xmlns="" val="20000"/>
                     </a:ext>
                   </a:extLst>
                 </a:gridCol>
                 <a:gridCol w="2407792">
                   <a:extLst>
                     <a:ext uri="{9D8B030D-6E8A-4147-A177-3AD203B41FA5}">
-                      <a16:colId xmlns="" xmlns:a16="http://schemas.microsoft.com/office/drawing/2014/main" val="20001"/>
+                      <a16:colId xmlns:a16="http://schemas.microsoft.com/office/drawing/2014/main" xmlns="" val="20001"/>
                     </a:ext>
                   </a:extLst>
                 </a:gridCol>
@@ -12494,7 +12605,7 @@
                 </a:tc>
                 <a:extLst>
                   <a:ext uri="{0D108BD9-81ED-4DB2-BD59-A6C34878D82A}">
-                    <a16:rowId xmlns="" xmlns:a16="http://schemas.microsoft.com/office/drawing/2014/main" val="10000"/>
+                    <a16:rowId xmlns:a16="http://schemas.microsoft.com/office/drawing/2014/main" xmlns="" val="10000"/>
                   </a:ext>
                 </a:extLst>
               </a:tr>
@@ -12642,7 +12753,7 @@
                 </a:tc>
                 <a:extLst>
                   <a:ext uri="{0D108BD9-81ED-4DB2-BD59-A6C34878D82A}">
-                    <a16:rowId xmlns="" xmlns:a16="http://schemas.microsoft.com/office/drawing/2014/main" val="10001"/>
+                    <a16:rowId xmlns:a16="http://schemas.microsoft.com/office/drawing/2014/main" xmlns="" val="10001"/>
                   </a:ext>
                 </a:extLst>
               </a:tr>
@@ -12894,7 +13005,7 @@
           <p:cNvPr id="43" name="그룹 36">
             <a:extLst>
               <a:ext uri="{FF2B5EF4-FFF2-40B4-BE49-F238E27FC236}">
-                <a16:creationId xmlns="" xmlns:a16="http://schemas.microsoft.com/office/drawing/2014/main" id="{18D6D656-6CB7-4BC7-96BC-AA35F78F28ED}"/>
+                <a16:creationId xmlns:a16="http://schemas.microsoft.com/office/drawing/2014/main" xmlns="" id="{18D6D656-6CB7-4BC7-96BC-AA35F78F28ED}"/>
               </a:ext>
             </a:extLst>
           </p:cNvPr>
@@ -12914,7 +13025,7 @@
             <p:cNvPr id="51" name="직사각형 49">
               <a:extLst>
                 <a:ext uri="{FF2B5EF4-FFF2-40B4-BE49-F238E27FC236}">
-                  <a16:creationId xmlns="" xmlns:a16="http://schemas.microsoft.com/office/drawing/2014/main" id="{5DFA35AB-205F-4BB9-98A2-4B0EA566278D}"/>
+                  <a16:creationId xmlns:a16="http://schemas.microsoft.com/office/drawing/2014/main" xmlns="" id="{5DFA35AB-205F-4BB9-98A2-4B0EA566278D}"/>
                 </a:ext>
               </a:extLst>
             </p:cNvPr>
@@ -12973,7 +13084,7 @@
             <p:cNvPr id="52" name="Picture 2">
               <a:extLst>
                 <a:ext uri="{FF2B5EF4-FFF2-40B4-BE49-F238E27FC236}">
-                  <a16:creationId xmlns="" xmlns:a16="http://schemas.microsoft.com/office/drawing/2014/main" id="{B27C3D8A-F700-4BE7-8D21-0F05E749AFDE}"/>
+                  <a16:creationId xmlns:a16="http://schemas.microsoft.com/office/drawing/2014/main" xmlns="" id="{B27C3D8A-F700-4BE7-8D21-0F05E749AFDE}"/>
                 </a:ext>
               </a:extLst>
             </p:cNvPr>
@@ -13043,7 +13154,7 @@
             <p:cNvPr id="53" name="직사각형 51">
               <a:extLst>
                 <a:ext uri="{FF2B5EF4-FFF2-40B4-BE49-F238E27FC236}">
-                  <a16:creationId xmlns="" xmlns:a16="http://schemas.microsoft.com/office/drawing/2014/main" id="{ABAEC106-523B-414C-B192-870ED5DA7867}"/>
+                  <a16:creationId xmlns:a16="http://schemas.microsoft.com/office/drawing/2014/main" xmlns="" id="{ABAEC106-523B-414C-B192-870ED5DA7867}"/>
                 </a:ext>
               </a:extLst>
             </p:cNvPr>
@@ -13127,7 +13238,7 @@
             <p:cNvPr id="54" name="직사각형 52">
               <a:extLst>
                 <a:ext uri="{FF2B5EF4-FFF2-40B4-BE49-F238E27FC236}">
-                  <a16:creationId xmlns="" xmlns:a16="http://schemas.microsoft.com/office/drawing/2014/main" id="{32B0006D-0022-498F-976D-6C0225244373}"/>
+                  <a16:creationId xmlns:a16="http://schemas.microsoft.com/office/drawing/2014/main" xmlns="" id="{32B0006D-0022-498F-976D-6C0225244373}"/>
                 </a:ext>
               </a:extLst>
             </p:cNvPr>
@@ -13192,7 +13303,7 @@
             <p:cNvPr id="55" name="직사각형 53">
               <a:extLst>
                 <a:ext uri="{FF2B5EF4-FFF2-40B4-BE49-F238E27FC236}">
-                  <a16:creationId xmlns="" xmlns:a16="http://schemas.microsoft.com/office/drawing/2014/main" id="{CA8E2B83-C8D7-4508-A117-ECADA57E0F1F}"/>
+                  <a16:creationId xmlns:a16="http://schemas.microsoft.com/office/drawing/2014/main" xmlns="" id="{CA8E2B83-C8D7-4508-A117-ECADA57E0F1F}"/>
                 </a:ext>
               </a:extLst>
             </p:cNvPr>
@@ -13256,7 +13367,7 @@
             <p:cNvPr id="56" name="직사각형 59">
               <a:extLst>
                 <a:ext uri="{FF2B5EF4-FFF2-40B4-BE49-F238E27FC236}">
-                  <a16:creationId xmlns="" xmlns:a16="http://schemas.microsoft.com/office/drawing/2014/main" id="{84BD68A9-C620-4063-B146-98D7AE202EC0}"/>
+                  <a16:creationId xmlns:a16="http://schemas.microsoft.com/office/drawing/2014/main" xmlns="" id="{84BD68A9-C620-4063-B146-98D7AE202EC0}"/>
                 </a:ext>
               </a:extLst>
             </p:cNvPr>
@@ -13350,7 +13461,7 @@
           <p:cNvPr id="57" name="그룹 36">
             <a:extLst>
               <a:ext uri="{FF2B5EF4-FFF2-40B4-BE49-F238E27FC236}">
-                <a16:creationId xmlns="" xmlns:a16="http://schemas.microsoft.com/office/drawing/2014/main" id="{DDF5813C-E7B7-4FC4-9DD9-D0B0D2D6DE11}"/>
+                <a16:creationId xmlns:a16="http://schemas.microsoft.com/office/drawing/2014/main" xmlns="" id="{DDF5813C-E7B7-4FC4-9DD9-D0B0D2D6DE11}"/>
               </a:ext>
             </a:extLst>
           </p:cNvPr>
@@ -13370,7 +13481,7 @@
             <p:cNvPr id="58" name="직사각형 49">
               <a:extLst>
                 <a:ext uri="{FF2B5EF4-FFF2-40B4-BE49-F238E27FC236}">
-                  <a16:creationId xmlns="" xmlns:a16="http://schemas.microsoft.com/office/drawing/2014/main" id="{9AB36AA4-3375-4487-B379-F7C950D1FAF0}"/>
+                  <a16:creationId xmlns:a16="http://schemas.microsoft.com/office/drawing/2014/main" xmlns="" id="{9AB36AA4-3375-4487-B379-F7C950D1FAF0}"/>
                 </a:ext>
               </a:extLst>
             </p:cNvPr>
@@ -13429,7 +13540,7 @@
             <p:cNvPr id="59" name="Picture 2">
               <a:extLst>
                 <a:ext uri="{FF2B5EF4-FFF2-40B4-BE49-F238E27FC236}">
-                  <a16:creationId xmlns="" xmlns:a16="http://schemas.microsoft.com/office/drawing/2014/main" id="{F52977A8-3123-4D10-AF25-16CF017D9CAE}"/>
+                  <a16:creationId xmlns:a16="http://schemas.microsoft.com/office/drawing/2014/main" xmlns="" id="{F52977A8-3123-4D10-AF25-16CF017D9CAE}"/>
                 </a:ext>
               </a:extLst>
             </p:cNvPr>
@@ -13499,7 +13610,7 @@
             <p:cNvPr id="60" name="직사각형 51">
               <a:extLst>
                 <a:ext uri="{FF2B5EF4-FFF2-40B4-BE49-F238E27FC236}">
-                  <a16:creationId xmlns="" xmlns:a16="http://schemas.microsoft.com/office/drawing/2014/main" id="{ECDF853D-7AE6-4B9F-906F-E0C1123BAEA0}"/>
+                  <a16:creationId xmlns:a16="http://schemas.microsoft.com/office/drawing/2014/main" xmlns="" id="{ECDF853D-7AE6-4B9F-906F-E0C1123BAEA0}"/>
                 </a:ext>
               </a:extLst>
             </p:cNvPr>
@@ -13583,7 +13694,7 @@
             <p:cNvPr id="61" name="직사각형 52">
               <a:extLst>
                 <a:ext uri="{FF2B5EF4-FFF2-40B4-BE49-F238E27FC236}">
-                  <a16:creationId xmlns="" xmlns:a16="http://schemas.microsoft.com/office/drawing/2014/main" id="{E530D239-7B5C-4D49-90FC-8452393AF7A4}"/>
+                  <a16:creationId xmlns:a16="http://schemas.microsoft.com/office/drawing/2014/main" xmlns="" id="{E530D239-7B5C-4D49-90FC-8452393AF7A4}"/>
                 </a:ext>
               </a:extLst>
             </p:cNvPr>
@@ -13648,7 +13759,7 @@
             <p:cNvPr id="62" name="직사각형 53">
               <a:extLst>
                 <a:ext uri="{FF2B5EF4-FFF2-40B4-BE49-F238E27FC236}">
-                  <a16:creationId xmlns="" xmlns:a16="http://schemas.microsoft.com/office/drawing/2014/main" id="{4EC57A97-C4A4-4247-9748-C5E8A3B74796}"/>
+                  <a16:creationId xmlns:a16="http://schemas.microsoft.com/office/drawing/2014/main" xmlns="" id="{4EC57A97-C4A4-4247-9748-C5E8A3B74796}"/>
                 </a:ext>
               </a:extLst>
             </p:cNvPr>
@@ -13712,7 +13823,7 @@
             <p:cNvPr id="63" name="직사각형 59">
               <a:extLst>
                 <a:ext uri="{FF2B5EF4-FFF2-40B4-BE49-F238E27FC236}">
-                  <a16:creationId xmlns="" xmlns:a16="http://schemas.microsoft.com/office/drawing/2014/main" id="{3F7A45D3-FB1E-492F-A173-180E410908EF}"/>
+                  <a16:creationId xmlns:a16="http://schemas.microsoft.com/office/drawing/2014/main" xmlns="" id="{3F7A45D3-FB1E-492F-A173-180E410908EF}"/>
                 </a:ext>
               </a:extLst>
             </p:cNvPr>
@@ -13793,7 +13904,7 @@
           <p:cNvPr id="3" name="Speech Bubble: Rectangle 2">
             <a:extLst>
               <a:ext uri="{FF2B5EF4-FFF2-40B4-BE49-F238E27FC236}">
-                <a16:creationId xmlns="" xmlns:a16="http://schemas.microsoft.com/office/drawing/2014/main" id="{BC613F83-282A-4751-BABC-F068076753CF}"/>
+                <a16:creationId xmlns:a16="http://schemas.microsoft.com/office/drawing/2014/main" xmlns="" id="{BC613F83-282A-4751-BABC-F068076753CF}"/>
               </a:ext>
             </a:extLst>
           </p:cNvPr>
@@ -14785,7 +14896,7 @@
                 <a:gridCol w="2688299">
                   <a:extLst>
                     <a:ext uri="{9D8B030D-6E8A-4147-A177-3AD203B41FA5}">
-                      <a16:colId xmlns="" xmlns:a16="http://schemas.microsoft.com/office/drawing/2014/main" val="20000"/>
+                      <a16:colId xmlns:a16="http://schemas.microsoft.com/office/drawing/2014/main" xmlns="" val="20000"/>
                     </a:ext>
                   </a:extLst>
                 </a:gridCol>
@@ -14817,7 +14928,7 @@
                 </a:tc>
                 <a:extLst>
                   <a:ext uri="{0D108BD9-81ED-4DB2-BD59-A6C34878D82A}">
-                    <a16:rowId xmlns="" xmlns:a16="http://schemas.microsoft.com/office/drawing/2014/main" val="10000"/>
+                    <a16:rowId xmlns:a16="http://schemas.microsoft.com/office/drawing/2014/main" xmlns="" val="10000"/>
                   </a:ext>
                 </a:extLst>
               </a:tr>
@@ -14845,7 +14956,7 @@
                 </a:tc>
                 <a:extLst>
                   <a:ext uri="{0D108BD9-81ED-4DB2-BD59-A6C34878D82A}">
-                    <a16:rowId xmlns="" xmlns:a16="http://schemas.microsoft.com/office/drawing/2014/main" val="10001"/>
+                    <a16:rowId xmlns:a16="http://schemas.microsoft.com/office/drawing/2014/main" xmlns="" val="10001"/>
                   </a:ext>
                 </a:extLst>
               </a:tr>
@@ -14931,14 +15042,14 @@
                 <a:gridCol w="280507">
                   <a:extLst>
                     <a:ext uri="{9D8B030D-6E8A-4147-A177-3AD203B41FA5}">
-                      <a16:colId xmlns="" xmlns:a16="http://schemas.microsoft.com/office/drawing/2014/main" val="20000"/>
+                      <a16:colId xmlns:a16="http://schemas.microsoft.com/office/drawing/2014/main" xmlns="" val="20000"/>
                     </a:ext>
                   </a:extLst>
                 </a:gridCol>
                 <a:gridCol w="2407792">
                   <a:extLst>
                     <a:ext uri="{9D8B030D-6E8A-4147-A177-3AD203B41FA5}">
-                      <a16:colId xmlns="" xmlns:a16="http://schemas.microsoft.com/office/drawing/2014/main" val="20001"/>
+                      <a16:colId xmlns:a16="http://schemas.microsoft.com/office/drawing/2014/main" xmlns="" val="20001"/>
                     </a:ext>
                   </a:extLst>
                 </a:gridCol>
@@ -15000,7 +15111,7 @@
                 </a:tc>
                 <a:extLst>
                   <a:ext uri="{0D108BD9-81ED-4DB2-BD59-A6C34878D82A}">
-                    <a16:rowId xmlns="" xmlns:a16="http://schemas.microsoft.com/office/drawing/2014/main" val="10000"/>
+                    <a16:rowId xmlns:a16="http://schemas.microsoft.com/office/drawing/2014/main" xmlns="" val="10000"/>
                   </a:ext>
                 </a:extLst>
               </a:tr>
@@ -15078,7 +15189,7 @@
                 </a:tc>
                 <a:extLst>
                   <a:ext uri="{0D108BD9-81ED-4DB2-BD59-A6C34878D82A}">
-                    <a16:rowId xmlns="" xmlns:a16="http://schemas.microsoft.com/office/drawing/2014/main" val="10001"/>
+                    <a16:rowId xmlns:a16="http://schemas.microsoft.com/office/drawing/2014/main" xmlns="" val="10001"/>
                   </a:ext>
                 </a:extLst>
               </a:tr>
@@ -15188,7 +15299,7 @@
                 </a:tc>
                 <a:extLst>
                   <a:ext uri="{0D108BD9-81ED-4DB2-BD59-A6C34878D82A}">
-                    <a16:rowId xmlns="" xmlns:a16="http://schemas.microsoft.com/office/drawing/2014/main" val="10002"/>
+                    <a16:rowId xmlns:a16="http://schemas.microsoft.com/office/drawing/2014/main" xmlns="" val="10002"/>
                   </a:ext>
                 </a:extLst>
               </a:tr>
@@ -15354,7 +15465,7 @@
                 </a:tc>
                 <a:extLst>
                   <a:ext uri="{0D108BD9-81ED-4DB2-BD59-A6C34878D82A}">
-                    <a16:rowId xmlns="" xmlns:a16="http://schemas.microsoft.com/office/drawing/2014/main" val="10003"/>
+                    <a16:rowId xmlns:a16="http://schemas.microsoft.com/office/drawing/2014/main" xmlns="" val="10003"/>
                   </a:ext>
                 </a:extLst>
               </a:tr>
@@ -17895,7 +18006,7 @@
                 <a:gridCol w="2688299">
                   <a:extLst>
                     <a:ext uri="{9D8B030D-6E8A-4147-A177-3AD203B41FA5}">
-                      <a16:colId xmlns="" xmlns:a16="http://schemas.microsoft.com/office/drawing/2014/main" val="20000"/>
+                      <a16:colId xmlns:a16="http://schemas.microsoft.com/office/drawing/2014/main" xmlns="" val="20000"/>
                     </a:ext>
                   </a:extLst>
                 </a:gridCol>
@@ -17927,7 +18038,7 @@
                 </a:tc>
                 <a:extLst>
                   <a:ext uri="{0D108BD9-81ED-4DB2-BD59-A6C34878D82A}">
-                    <a16:rowId xmlns="" xmlns:a16="http://schemas.microsoft.com/office/drawing/2014/main" val="10000"/>
+                    <a16:rowId xmlns:a16="http://schemas.microsoft.com/office/drawing/2014/main" xmlns="" val="10000"/>
                   </a:ext>
                 </a:extLst>
               </a:tr>
@@ -17955,7 +18066,7 @@
                 </a:tc>
                 <a:extLst>
                   <a:ext uri="{0D108BD9-81ED-4DB2-BD59-A6C34878D82A}">
-                    <a16:rowId xmlns="" xmlns:a16="http://schemas.microsoft.com/office/drawing/2014/main" val="10001"/>
+                    <a16:rowId xmlns:a16="http://schemas.microsoft.com/office/drawing/2014/main" xmlns="" val="10001"/>
                   </a:ext>
                 </a:extLst>
               </a:tr>
@@ -18041,14 +18152,14 @@
                 <a:gridCol w="280507">
                   <a:extLst>
                     <a:ext uri="{9D8B030D-6E8A-4147-A177-3AD203B41FA5}">
-                      <a16:colId xmlns="" xmlns:a16="http://schemas.microsoft.com/office/drawing/2014/main" val="20000"/>
+                      <a16:colId xmlns:a16="http://schemas.microsoft.com/office/drawing/2014/main" xmlns="" val="20000"/>
                     </a:ext>
                   </a:extLst>
                 </a:gridCol>
                 <a:gridCol w="2407792">
                   <a:extLst>
                     <a:ext uri="{9D8B030D-6E8A-4147-A177-3AD203B41FA5}">
-                      <a16:colId xmlns="" xmlns:a16="http://schemas.microsoft.com/office/drawing/2014/main" val="20001"/>
+                      <a16:colId xmlns:a16="http://schemas.microsoft.com/office/drawing/2014/main" xmlns="" val="20001"/>
                     </a:ext>
                   </a:extLst>
                 </a:gridCol>
@@ -18110,7 +18221,7 @@
                 </a:tc>
                 <a:extLst>
                   <a:ext uri="{0D108BD9-81ED-4DB2-BD59-A6C34878D82A}">
-                    <a16:rowId xmlns="" xmlns:a16="http://schemas.microsoft.com/office/drawing/2014/main" val="10000"/>
+                    <a16:rowId xmlns:a16="http://schemas.microsoft.com/office/drawing/2014/main" xmlns="" val="10000"/>
                   </a:ext>
                 </a:extLst>
               </a:tr>
@@ -18267,7 +18378,7 @@
                 </a:tc>
                 <a:extLst>
                   <a:ext uri="{0D108BD9-81ED-4DB2-BD59-A6C34878D82A}">
-                    <a16:rowId xmlns="" xmlns:a16="http://schemas.microsoft.com/office/drawing/2014/main" val="10001"/>
+                    <a16:rowId xmlns:a16="http://schemas.microsoft.com/office/drawing/2014/main" xmlns="" val="10001"/>
                   </a:ext>
                 </a:extLst>
               </a:tr>
@@ -23445,7 +23556,7 @@
                 <a:gridCol w="2688299">
                   <a:extLst>
                     <a:ext uri="{9D8B030D-6E8A-4147-A177-3AD203B41FA5}">
-                      <a16:colId xmlns="" xmlns:a16="http://schemas.microsoft.com/office/drawing/2014/main" val="20000"/>
+                      <a16:colId xmlns:a16="http://schemas.microsoft.com/office/drawing/2014/main" xmlns="" val="20000"/>
                     </a:ext>
                   </a:extLst>
                 </a:gridCol>
@@ -23477,7 +23588,7 @@
                 </a:tc>
                 <a:extLst>
                   <a:ext uri="{0D108BD9-81ED-4DB2-BD59-A6C34878D82A}">
-                    <a16:rowId xmlns="" xmlns:a16="http://schemas.microsoft.com/office/drawing/2014/main" val="10000"/>
+                    <a16:rowId xmlns:a16="http://schemas.microsoft.com/office/drawing/2014/main" xmlns="" val="10000"/>
                   </a:ext>
                 </a:extLst>
               </a:tr>
@@ -23509,7 +23620,7 @@
                 </a:tc>
                 <a:extLst>
                   <a:ext uri="{0D108BD9-81ED-4DB2-BD59-A6C34878D82A}">
-                    <a16:rowId xmlns="" xmlns:a16="http://schemas.microsoft.com/office/drawing/2014/main" val="10001"/>
+                    <a16:rowId xmlns:a16="http://schemas.microsoft.com/office/drawing/2014/main" xmlns="" val="10001"/>
                   </a:ext>
                 </a:extLst>
               </a:tr>
@@ -23659,14 +23770,14 @@
                 <a:gridCol w="280507">
                   <a:extLst>
                     <a:ext uri="{9D8B030D-6E8A-4147-A177-3AD203B41FA5}">
-                      <a16:colId xmlns="" xmlns:a16="http://schemas.microsoft.com/office/drawing/2014/main" val="20000"/>
+                      <a16:colId xmlns:a16="http://schemas.microsoft.com/office/drawing/2014/main" xmlns="" val="20000"/>
                     </a:ext>
                   </a:extLst>
                 </a:gridCol>
                 <a:gridCol w="2407792">
                   <a:extLst>
                     <a:ext uri="{9D8B030D-6E8A-4147-A177-3AD203B41FA5}">
-                      <a16:colId xmlns="" xmlns:a16="http://schemas.microsoft.com/office/drawing/2014/main" val="20001"/>
+                      <a16:colId xmlns:a16="http://schemas.microsoft.com/office/drawing/2014/main" xmlns="" val="20001"/>
                     </a:ext>
                   </a:extLst>
                 </a:gridCol>
@@ -23728,7 +23839,7 @@
                 </a:tc>
                 <a:extLst>
                   <a:ext uri="{0D108BD9-81ED-4DB2-BD59-A6C34878D82A}">
-                    <a16:rowId xmlns="" xmlns:a16="http://schemas.microsoft.com/office/drawing/2014/main" val="10000"/>
+                    <a16:rowId xmlns:a16="http://schemas.microsoft.com/office/drawing/2014/main" xmlns="" val="10000"/>
                   </a:ext>
                 </a:extLst>
               </a:tr>
@@ -23799,7 +23910,7 @@
                 </a:tc>
                 <a:extLst>
                   <a:ext uri="{0D108BD9-81ED-4DB2-BD59-A6C34878D82A}">
-                    <a16:rowId xmlns="" xmlns:a16="http://schemas.microsoft.com/office/drawing/2014/main" val="10001"/>
+                    <a16:rowId xmlns:a16="http://schemas.microsoft.com/office/drawing/2014/main" xmlns="" val="10001"/>
                   </a:ext>
                 </a:extLst>
               </a:tr>
@@ -23992,7 +24103,7 @@
                 </a:tc>
                 <a:extLst>
                   <a:ext uri="{0D108BD9-81ED-4DB2-BD59-A6C34878D82A}">
-                    <a16:rowId xmlns="" xmlns:a16="http://schemas.microsoft.com/office/drawing/2014/main" val="10002"/>
+                    <a16:rowId xmlns:a16="http://schemas.microsoft.com/office/drawing/2014/main" xmlns="" val="10002"/>
                   </a:ext>
                 </a:extLst>
               </a:tr>
@@ -27160,7 +27271,7 @@
                 <a:gridCol w="2688299">
                   <a:extLst>
                     <a:ext uri="{9D8B030D-6E8A-4147-A177-3AD203B41FA5}">
-                      <a16:colId xmlns="" xmlns:a16="http://schemas.microsoft.com/office/drawing/2014/main" val="20000"/>
+                      <a16:colId xmlns:a16="http://schemas.microsoft.com/office/drawing/2014/main" xmlns="" val="20000"/>
                     </a:ext>
                   </a:extLst>
                 </a:gridCol>
@@ -27192,7 +27303,7 @@
                 </a:tc>
                 <a:extLst>
                   <a:ext uri="{0D108BD9-81ED-4DB2-BD59-A6C34878D82A}">
-                    <a16:rowId xmlns="" xmlns:a16="http://schemas.microsoft.com/office/drawing/2014/main" val="10000"/>
+                    <a16:rowId xmlns:a16="http://schemas.microsoft.com/office/drawing/2014/main" xmlns="" val="10000"/>
                   </a:ext>
                 </a:extLst>
               </a:tr>
@@ -27220,7 +27331,7 @@
                 </a:tc>
                 <a:extLst>
                   <a:ext uri="{0D108BD9-81ED-4DB2-BD59-A6C34878D82A}">
-                    <a16:rowId xmlns="" xmlns:a16="http://schemas.microsoft.com/office/drawing/2014/main" val="10001"/>
+                    <a16:rowId xmlns:a16="http://schemas.microsoft.com/office/drawing/2014/main" xmlns="" val="10001"/>
                   </a:ext>
                 </a:extLst>
               </a:tr>
@@ -27254,14 +27365,14 @@
                 <a:gridCol w="280507">
                   <a:extLst>
                     <a:ext uri="{9D8B030D-6E8A-4147-A177-3AD203B41FA5}">
-                      <a16:colId xmlns="" xmlns:a16="http://schemas.microsoft.com/office/drawing/2014/main" val="20000"/>
+                      <a16:colId xmlns:a16="http://schemas.microsoft.com/office/drawing/2014/main" xmlns="" val="20000"/>
                     </a:ext>
                   </a:extLst>
                 </a:gridCol>
                 <a:gridCol w="2407792">
                   <a:extLst>
                     <a:ext uri="{9D8B030D-6E8A-4147-A177-3AD203B41FA5}">
-                      <a16:colId xmlns="" xmlns:a16="http://schemas.microsoft.com/office/drawing/2014/main" val="20001"/>
+                      <a16:colId xmlns:a16="http://schemas.microsoft.com/office/drawing/2014/main" xmlns="" val="20001"/>
                     </a:ext>
                   </a:extLst>
                 </a:gridCol>
@@ -27323,7 +27434,7 @@
                 </a:tc>
                 <a:extLst>
                   <a:ext uri="{0D108BD9-81ED-4DB2-BD59-A6C34878D82A}">
-                    <a16:rowId xmlns="" xmlns:a16="http://schemas.microsoft.com/office/drawing/2014/main" val="10000"/>
+                    <a16:rowId xmlns:a16="http://schemas.microsoft.com/office/drawing/2014/main" xmlns="" val="10000"/>
                   </a:ext>
                 </a:extLst>
               </a:tr>
@@ -27415,7 +27526,7 @@
                 </a:tc>
                 <a:extLst>
                   <a:ext uri="{0D108BD9-81ED-4DB2-BD59-A6C34878D82A}">
-                    <a16:rowId xmlns="" xmlns:a16="http://schemas.microsoft.com/office/drawing/2014/main" val="10001"/>
+                    <a16:rowId xmlns:a16="http://schemas.microsoft.com/office/drawing/2014/main" xmlns="" val="10001"/>
                   </a:ext>
                 </a:extLst>
               </a:tr>
@@ -27525,7 +27636,7 @@
                 </a:tc>
                 <a:extLst>
                   <a:ext uri="{0D108BD9-81ED-4DB2-BD59-A6C34878D82A}">
-                    <a16:rowId xmlns="" xmlns:a16="http://schemas.microsoft.com/office/drawing/2014/main" val="10002"/>
+                    <a16:rowId xmlns:a16="http://schemas.microsoft.com/office/drawing/2014/main" xmlns="" val="10002"/>
                   </a:ext>
                 </a:extLst>
               </a:tr>
@@ -27650,7 +27761,7 @@
                 </a:tc>
                 <a:extLst>
                   <a:ext uri="{0D108BD9-81ED-4DB2-BD59-A6C34878D82A}">
-                    <a16:rowId xmlns="" xmlns:a16="http://schemas.microsoft.com/office/drawing/2014/main" val="10003"/>
+                    <a16:rowId xmlns:a16="http://schemas.microsoft.com/office/drawing/2014/main" xmlns="" val="10003"/>
                   </a:ext>
                 </a:extLst>
               </a:tr>
@@ -27796,7 +27907,7 @@
                 </a:tc>
                 <a:extLst>
                   <a:ext uri="{0D108BD9-81ED-4DB2-BD59-A6C34878D82A}">
-                    <a16:rowId xmlns="" xmlns:a16="http://schemas.microsoft.com/office/drawing/2014/main" val="10004"/>
+                    <a16:rowId xmlns:a16="http://schemas.microsoft.com/office/drawing/2014/main" xmlns="" val="10004"/>
                   </a:ext>
                 </a:extLst>
               </a:tr>
@@ -33957,7 +34068,7 @@
                 <a:gridCol w="2688299">
                   <a:extLst>
                     <a:ext uri="{9D8B030D-6E8A-4147-A177-3AD203B41FA5}">
-                      <a16:colId xmlns="" xmlns:a16="http://schemas.microsoft.com/office/drawing/2014/main" val="20000"/>
+                      <a16:colId xmlns:a16="http://schemas.microsoft.com/office/drawing/2014/main" xmlns="" val="20000"/>
                     </a:ext>
                   </a:extLst>
                 </a:gridCol>
@@ -33989,7 +34100,7 @@
                 </a:tc>
                 <a:extLst>
                   <a:ext uri="{0D108BD9-81ED-4DB2-BD59-A6C34878D82A}">
-                    <a16:rowId xmlns="" xmlns:a16="http://schemas.microsoft.com/office/drawing/2014/main" val="10000"/>
+                    <a16:rowId xmlns:a16="http://schemas.microsoft.com/office/drawing/2014/main" xmlns="" val="10000"/>
                   </a:ext>
                 </a:extLst>
               </a:tr>
@@ -34028,7 +34139,7 @@
                 </a:tc>
                 <a:extLst>
                   <a:ext uri="{0D108BD9-81ED-4DB2-BD59-A6C34878D82A}">
-                    <a16:rowId xmlns="" xmlns:a16="http://schemas.microsoft.com/office/drawing/2014/main" val="10001"/>
+                    <a16:rowId xmlns:a16="http://schemas.microsoft.com/office/drawing/2014/main" xmlns="" val="10001"/>
                   </a:ext>
                 </a:extLst>
               </a:tr>
@@ -34114,14 +34225,14 @@
                 <a:gridCol w="280507">
                   <a:extLst>
                     <a:ext uri="{9D8B030D-6E8A-4147-A177-3AD203B41FA5}">
-                      <a16:colId xmlns="" xmlns:a16="http://schemas.microsoft.com/office/drawing/2014/main" val="20000"/>
+                      <a16:colId xmlns:a16="http://schemas.microsoft.com/office/drawing/2014/main" xmlns="" val="20000"/>
                     </a:ext>
                   </a:extLst>
                 </a:gridCol>
                 <a:gridCol w="2407792">
                   <a:extLst>
                     <a:ext uri="{9D8B030D-6E8A-4147-A177-3AD203B41FA5}">
-                      <a16:colId xmlns="" xmlns:a16="http://schemas.microsoft.com/office/drawing/2014/main" val="20001"/>
+                      <a16:colId xmlns:a16="http://schemas.microsoft.com/office/drawing/2014/main" xmlns="" val="20001"/>
                     </a:ext>
                   </a:extLst>
                 </a:gridCol>
@@ -34183,7 +34294,7 @@
                 </a:tc>
                 <a:extLst>
                   <a:ext uri="{0D108BD9-81ED-4DB2-BD59-A6C34878D82A}">
-                    <a16:rowId xmlns="" xmlns:a16="http://schemas.microsoft.com/office/drawing/2014/main" val="10000"/>
+                    <a16:rowId xmlns:a16="http://schemas.microsoft.com/office/drawing/2014/main" xmlns="" val="10000"/>
                   </a:ext>
                 </a:extLst>
               </a:tr>
@@ -34268,7 +34379,7 @@
                 </a:tc>
                 <a:extLst>
                   <a:ext uri="{0D108BD9-81ED-4DB2-BD59-A6C34878D82A}">
-                    <a16:rowId xmlns="" xmlns:a16="http://schemas.microsoft.com/office/drawing/2014/main" val="10001"/>
+                    <a16:rowId xmlns:a16="http://schemas.microsoft.com/office/drawing/2014/main" xmlns="" val="10001"/>
                   </a:ext>
                 </a:extLst>
               </a:tr>
@@ -34377,7 +34488,7 @@
                 </a:tc>
                 <a:extLst>
                   <a:ext uri="{0D108BD9-81ED-4DB2-BD59-A6C34878D82A}">
-                    <a16:rowId xmlns="" xmlns:a16="http://schemas.microsoft.com/office/drawing/2014/main" val="10002"/>
+                    <a16:rowId xmlns:a16="http://schemas.microsoft.com/office/drawing/2014/main" xmlns="" val="10002"/>
                   </a:ext>
                 </a:extLst>
               </a:tr>
@@ -37465,14 +37576,7 @@
                           <a:latin typeface="나눔바른고딕" panose="020B0603020101020101" pitchFamily="50" charset="-127"/>
                           <a:ea typeface="나눔바른고딕" panose="020B0603020101020101" pitchFamily="50" charset="-127"/>
                         </a:rPr>
-                        <a:t> </a:t>
-                      </a:r>
-                      <a:r>
-                        <a:rPr lang="ko-KR" altLang="en-US" sz="900" baseline="0" smtClean="0">
-                          <a:latin typeface="나눔바른고딕" panose="020B0603020101020101" pitchFamily="50" charset="-127"/>
-                          <a:ea typeface="나눔바른고딕" panose="020B0603020101020101" pitchFamily="50" charset="-127"/>
-                        </a:rPr>
-                        <a:t>표시</a:t>
+                        <a:t> 표시</a:t>
                       </a:r>
                       <a:endParaRPr lang="en-US" altLang="ko-KR" sz="900" baseline="0" smtClean="0">
                         <a:latin typeface="나눔바른고딕" panose="020B0603020101020101" pitchFamily="50" charset="-127"/>
@@ -37876,6 +37980,2558 @@
   <p:clrMapOvr>
     <a:masterClrMapping/>
   </p:clrMapOvr>
+</p:sld>
+</file>
+
+<file path=ppt/slides/slide26.xml><?xml version="1.0" encoding="utf-8"?>
+<p:sld xmlns:a="http://schemas.openxmlformats.org/drawingml/2006/main" xmlns:r="http://schemas.openxmlformats.org/officeDocument/2006/relationships" xmlns:p="http://schemas.openxmlformats.org/presentationml/2006/main">
+  <p:cSld>
+    <p:spTree>
+      <p:nvGrpSpPr>
+        <p:cNvPr id="1" name="Shape 101"/>
+        <p:cNvGrpSpPr/>
+        <p:nvPr/>
+      </p:nvGrpSpPr>
+      <p:grpSpPr>
+        <a:xfrm>
+          <a:off x="0" y="0"/>
+          <a:ext cx="0" cy="0"/>
+          <a:chOff x="0" y="0"/>
+          <a:chExt cx="0" cy="0"/>
+        </a:xfrm>
+      </p:grpSpPr>
+      <p:sp>
+        <p:nvSpPr>
+          <p:cNvPr id="102" name="Google Shape;102;p18"/>
+          <p:cNvSpPr txBox="1">
+            <a:spLocks noGrp="1"/>
+          </p:cNvSpPr>
+          <p:nvPr>
+            <p:ph type="ctrTitle" idx="4294967295"/>
+          </p:nvPr>
+        </p:nvSpPr>
+        <p:spPr>
+          <a:xfrm>
+            <a:off x="0" y="2948947"/>
+            <a:ext cx="12192000" cy="1546400"/>
+          </a:xfrm>
+          <a:prstGeom prst="rect">
+            <a:avLst/>
+          </a:prstGeom>
+        </p:spPr>
+        <p:txBody>
+          <a:bodyPr spcFirstLastPara="1" vert="horz" wrap="square" lIns="121900" tIns="121900" rIns="121900" bIns="121900" rtlCol="0" anchor="t" anchorCtr="0">
+            <a:noAutofit/>
+          </a:bodyPr>
+          <a:lstStyle/>
+          <a:p>
+            <a:pPr algn="ctr">
+              <a:spcBef>
+                <a:spcPts val="0"/>
+              </a:spcBef>
+            </a:pPr>
+            <a:r>
+              <a:rPr lang="en-US" sz="5333" dirty="0" smtClean="0">
+                <a:solidFill>
+                  <a:srgbClr val="FF9E00"/>
+                </a:solidFill>
+              </a:rPr>
+              <a:t>0. </a:t>
+            </a:r>
+            <a:r>
+              <a:rPr lang="ko-KR" altLang="en-US" sz="5333" dirty="0" smtClean="0">
+                <a:solidFill>
+                  <a:srgbClr val="FF9E00"/>
+                </a:solidFill>
+              </a:rPr>
+              <a:t>통합테스트</a:t>
+            </a:r>
+            <a:endParaRPr sz="5333" dirty="0">
+              <a:solidFill>
+                <a:srgbClr val="FF9E00"/>
+              </a:solidFill>
+            </a:endParaRPr>
+          </a:p>
+        </p:txBody>
+      </p:sp>
+      <p:grpSp>
+        <p:nvGrpSpPr>
+          <p:cNvPr id="104" name="Google Shape;104;p18"/>
+          <p:cNvGrpSpPr/>
+          <p:nvPr/>
+        </p:nvGrpSpPr>
+        <p:grpSpPr>
+          <a:xfrm>
+            <a:off x="5644650" y="665334"/>
+            <a:ext cx="902705" cy="1471639"/>
+            <a:chOff x="6730350" y="2315900"/>
+            <a:chExt cx="257700" cy="420100"/>
+          </a:xfrm>
+        </p:grpSpPr>
+        <p:sp>
+          <p:nvSpPr>
+            <p:cNvPr id="105" name="Google Shape;105;p18"/>
+            <p:cNvSpPr/>
+            <p:nvPr/>
+          </p:nvSpPr>
+          <p:spPr>
+            <a:xfrm>
+              <a:off x="6807900" y="2671250"/>
+              <a:ext cx="102600" cy="22625"/>
+            </a:xfrm>
+            <a:custGeom>
+              <a:avLst/>
+              <a:gdLst/>
+              <a:ahLst/>
+              <a:cxnLst/>
+              <a:rect l="l" t="t" r="r" b="b"/>
+              <a:pathLst>
+                <a:path w="4104" h="905" extrusionOk="0">
+                  <a:moveTo>
+                    <a:pt x="1" y="1"/>
+                  </a:moveTo>
+                  <a:lnTo>
+                    <a:pt x="1" y="905"/>
+                  </a:lnTo>
+                  <a:lnTo>
+                    <a:pt x="4104" y="905"/>
+                  </a:lnTo>
+                  <a:lnTo>
+                    <a:pt x="4104" y="1"/>
+                  </a:lnTo>
+                  <a:close/>
+                </a:path>
+              </a:pathLst>
+            </a:custGeom>
+            <a:solidFill>
+              <a:srgbClr val="FF9E00"/>
+            </a:solidFill>
+            <a:ln>
+              <a:noFill/>
+            </a:ln>
+          </p:spPr>
+          <p:txBody>
+            <a:bodyPr spcFirstLastPara="1" wrap="square" lIns="121900" tIns="121900" rIns="121900" bIns="121900" anchor="ctr" anchorCtr="0">
+              <a:noAutofit/>
+            </a:bodyPr>
+            <a:lstStyle/>
+            <a:p>
+              <a:endParaRPr sz="2400">
+                <a:solidFill>
+                  <a:srgbClr val="FFFFFF"/>
+                </a:solidFill>
+              </a:endParaRPr>
+            </a:p>
+          </p:txBody>
+        </p:sp>
+        <p:sp>
+          <p:nvSpPr>
+            <p:cNvPr id="106" name="Google Shape;106;p18"/>
+            <p:cNvSpPr/>
+            <p:nvPr/>
+          </p:nvSpPr>
+          <p:spPr>
+            <a:xfrm>
+              <a:off x="6807900" y="2636450"/>
+              <a:ext cx="102600" cy="22625"/>
+            </a:xfrm>
+            <a:custGeom>
+              <a:avLst/>
+              <a:gdLst/>
+              <a:ahLst/>
+              <a:cxnLst/>
+              <a:rect l="l" t="t" r="r" b="b"/>
+              <a:pathLst>
+                <a:path w="4104" h="905" extrusionOk="0">
+                  <a:moveTo>
+                    <a:pt x="1" y="1"/>
+                  </a:moveTo>
+                  <a:lnTo>
+                    <a:pt x="1" y="905"/>
+                  </a:lnTo>
+                  <a:lnTo>
+                    <a:pt x="4104" y="905"/>
+                  </a:lnTo>
+                  <a:lnTo>
+                    <a:pt x="4104" y="1"/>
+                  </a:lnTo>
+                  <a:close/>
+                </a:path>
+              </a:pathLst>
+            </a:custGeom>
+            <a:solidFill>
+              <a:srgbClr val="FF9E00"/>
+            </a:solidFill>
+            <a:ln>
+              <a:noFill/>
+            </a:ln>
+          </p:spPr>
+          <p:txBody>
+            <a:bodyPr spcFirstLastPara="1" wrap="square" lIns="121900" tIns="121900" rIns="121900" bIns="121900" anchor="ctr" anchorCtr="0">
+              <a:noAutofit/>
+            </a:bodyPr>
+            <a:lstStyle/>
+            <a:p>
+              <a:endParaRPr sz="2400">
+                <a:solidFill>
+                  <a:srgbClr val="FFFFFF"/>
+                </a:solidFill>
+              </a:endParaRPr>
+            </a:p>
+          </p:txBody>
+        </p:sp>
+        <p:sp>
+          <p:nvSpPr>
+            <p:cNvPr id="107" name="Google Shape;107;p18"/>
+            <p:cNvSpPr/>
+            <p:nvPr/>
+          </p:nvSpPr>
+          <p:spPr>
+            <a:xfrm>
+              <a:off x="6807900" y="2706075"/>
+              <a:ext cx="102600" cy="29925"/>
+            </a:xfrm>
+            <a:custGeom>
+              <a:avLst/>
+              <a:gdLst/>
+              <a:ahLst/>
+              <a:cxnLst/>
+              <a:rect l="l" t="t" r="r" b="b"/>
+              <a:pathLst>
+                <a:path w="4104" h="1197" extrusionOk="0">
+                  <a:moveTo>
+                    <a:pt x="1" y="0"/>
+                  </a:moveTo>
+                  <a:lnTo>
+                    <a:pt x="1" y="171"/>
+                  </a:lnTo>
+                  <a:lnTo>
+                    <a:pt x="25" y="318"/>
+                  </a:lnTo>
+                  <a:lnTo>
+                    <a:pt x="98" y="464"/>
+                  </a:lnTo>
+                  <a:lnTo>
+                    <a:pt x="196" y="586"/>
+                  </a:lnTo>
+                  <a:lnTo>
+                    <a:pt x="343" y="660"/>
+                  </a:lnTo>
+                  <a:lnTo>
+                    <a:pt x="1881" y="1172"/>
+                  </a:lnTo>
+                  <a:lnTo>
+                    <a:pt x="2052" y="1197"/>
+                  </a:lnTo>
+                  <a:lnTo>
+                    <a:pt x="2223" y="1172"/>
+                  </a:lnTo>
+                  <a:lnTo>
+                    <a:pt x="3762" y="660"/>
+                  </a:lnTo>
+                  <a:lnTo>
+                    <a:pt x="3908" y="586"/>
+                  </a:lnTo>
+                  <a:lnTo>
+                    <a:pt x="4006" y="464"/>
+                  </a:lnTo>
+                  <a:lnTo>
+                    <a:pt x="4079" y="318"/>
+                  </a:lnTo>
+                  <a:lnTo>
+                    <a:pt x="4104" y="171"/>
+                  </a:lnTo>
+                  <a:lnTo>
+                    <a:pt x="4104" y="0"/>
+                  </a:lnTo>
+                  <a:close/>
+                </a:path>
+              </a:pathLst>
+            </a:custGeom>
+            <a:solidFill>
+              <a:srgbClr val="FF9E00"/>
+            </a:solidFill>
+            <a:ln>
+              <a:noFill/>
+            </a:ln>
+          </p:spPr>
+          <p:txBody>
+            <a:bodyPr spcFirstLastPara="1" wrap="square" lIns="121900" tIns="121900" rIns="121900" bIns="121900" anchor="ctr" anchorCtr="0">
+              <a:noAutofit/>
+            </a:bodyPr>
+            <a:lstStyle/>
+            <a:p>
+              <a:endParaRPr sz="2400">
+                <a:solidFill>
+                  <a:srgbClr val="FFFFFF"/>
+                </a:solidFill>
+              </a:endParaRPr>
+            </a:p>
+          </p:txBody>
+        </p:sp>
+        <p:sp>
+          <p:nvSpPr>
+            <p:cNvPr id="108" name="Google Shape;108;p18"/>
+            <p:cNvSpPr/>
+            <p:nvPr/>
+          </p:nvSpPr>
+          <p:spPr>
+            <a:xfrm>
+              <a:off x="6811575" y="2463675"/>
+              <a:ext cx="95275" cy="160600"/>
+            </a:xfrm>
+            <a:custGeom>
+              <a:avLst/>
+              <a:gdLst/>
+              <a:ahLst/>
+              <a:cxnLst/>
+              <a:rect l="l" t="t" r="r" b="b"/>
+              <a:pathLst>
+                <a:path w="3811" h="6424" extrusionOk="0">
+                  <a:moveTo>
+                    <a:pt x="1905" y="0"/>
+                  </a:moveTo>
+                  <a:lnTo>
+                    <a:pt x="928" y="831"/>
+                  </a:lnTo>
+                  <a:lnTo>
+                    <a:pt x="855" y="879"/>
+                  </a:lnTo>
+                  <a:lnTo>
+                    <a:pt x="782" y="904"/>
+                  </a:lnTo>
+                  <a:lnTo>
+                    <a:pt x="684" y="879"/>
+                  </a:lnTo>
+                  <a:lnTo>
+                    <a:pt x="611" y="831"/>
+                  </a:lnTo>
+                  <a:lnTo>
+                    <a:pt x="0" y="318"/>
+                  </a:lnTo>
+                  <a:lnTo>
+                    <a:pt x="1319" y="6423"/>
+                  </a:lnTo>
+                  <a:lnTo>
+                    <a:pt x="2491" y="6423"/>
+                  </a:lnTo>
+                  <a:lnTo>
+                    <a:pt x="3810" y="318"/>
+                  </a:lnTo>
+                  <a:lnTo>
+                    <a:pt x="3200" y="831"/>
+                  </a:lnTo>
+                  <a:lnTo>
+                    <a:pt x="3126" y="879"/>
+                  </a:lnTo>
+                  <a:lnTo>
+                    <a:pt x="3029" y="904"/>
+                  </a:lnTo>
+                  <a:lnTo>
+                    <a:pt x="2955" y="879"/>
+                  </a:lnTo>
+                  <a:lnTo>
+                    <a:pt x="2882" y="831"/>
+                  </a:lnTo>
+                  <a:lnTo>
+                    <a:pt x="1905" y="0"/>
+                  </a:lnTo>
+                  <a:close/>
+                </a:path>
+              </a:pathLst>
+            </a:custGeom>
+            <a:solidFill>
+              <a:srgbClr val="FF9E00"/>
+            </a:solidFill>
+            <a:ln>
+              <a:noFill/>
+            </a:ln>
+          </p:spPr>
+          <p:txBody>
+            <a:bodyPr spcFirstLastPara="1" wrap="square" lIns="121900" tIns="121900" rIns="121900" bIns="121900" anchor="ctr" anchorCtr="0">
+              <a:noAutofit/>
+            </a:bodyPr>
+            <a:lstStyle/>
+            <a:p>
+              <a:endParaRPr sz="2400">
+                <a:solidFill>
+                  <a:srgbClr val="FFFFFF"/>
+                </a:solidFill>
+              </a:endParaRPr>
+            </a:p>
+          </p:txBody>
+        </p:sp>
+        <p:sp>
+          <p:nvSpPr>
+            <p:cNvPr id="109" name="Google Shape;109;p18"/>
+            <p:cNvSpPr/>
+            <p:nvPr/>
+          </p:nvSpPr>
+          <p:spPr>
+            <a:xfrm>
+              <a:off x="6730350" y="2315900"/>
+              <a:ext cx="257700" cy="308375"/>
+            </a:xfrm>
+            <a:custGeom>
+              <a:avLst/>
+              <a:gdLst/>
+              <a:ahLst/>
+              <a:cxnLst/>
+              <a:rect l="l" t="t" r="r" b="b"/>
+              <a:pathLst>
+                <a:path w="10308" h="12335" extrusionOk="0">
+                  <a:moveTo>
+                    <a:pt x="5154" y="1"/>
+                  </a:moveTo>
+                  <a:lnTo>
+                    <a:pt x="4617" y="25"/>
+                  </a:lnTo>
+                  <a:lnTo>
+                    <a:pt x="4128" y="98"/>
+                  </a:lnTo>
+                  <a:lnTo>
+                    <a:pt x="3615" y="245"/>
+                  </a:lnTo>
+                  <a:lnTo>
+                    <a:pt x="3151" y="416"/>
+                  </a:lnTo>
+                  <a:lnTo>
+                    <a:pt x="2712" y="636"/>
+                  </a:lnTo>
+                  <a:lnTo>
+                    <a:pt x="2272" y="880"/>
+                  </a:lnTo>
+                  <a:lnTo>
+                    <a:pt x="1881" y="1173"/>
+                  </a:lnTo>
+                  <a:lnTo>
+                    <a:pt x="1515" y="1515"/>
+                  </a:lnTo>
+                  <a:lnTo>
+                    <a:pt x="1198" y="1881"/>
+                  </a:lnTo>
+                  <a:lnTo>
+                    <a:pt x="880" y="2272"/>
+                  </a:lnTo>
+                  <a:lnTo>
+                    <a:pt x="636" y="2687"/>
+                  </a:lnTo>
+                  <a:lnTo>
+                    <a:pt x="416" y="3151"/>
+                  </a:lnTo>
+                  <a:lnTo>
+                    <a:pt x="245" y="3615"/>
+                  </a:lnTo>
+                  <a:lnTo>
+                    <a:pt x="123" y="4104"/>
+                  </a:lnTo>
+                  <a:lnTo>
+                    <a:pt x="50" y="4617"/>
+                  </a:lnTo>
+                  <a:lnTo>
+                    <a:pt x="1" y="5154"/>
+                  </a:lnTo>
+                  <a:lnTo>
+                    <a:pt x="25" y="5423"/>
+                  </a:lnTo>
+                  <a:lnTo>
+                    <a:pt x="50" y="5691"/>
+                  </a:lnTo>
+                  <a:lnTo>
+                    <a:pt x="123" y="6204"/>
+                  </a:lnTo>
+                  <a:lnTo>
+                    <a:pt x="245" y="6693"/>
+                  </a:lnTo>
+                  <a:lnTo>
+                    <a:pt x="416" y="7132"/>
+                  </a:lnTo>
+                  <a:lnTo>
+                    <a:pt x="636" y="7572"/>
+                  </a:lnTo>
+                  <a:lnTo>
+                    <a:pt x="856" y="7963"/>
+                  </a:lnTo>
+                  <a:lnTo>
+                    <a:pt x="1100" y="8353"/>
+                  </a:lnTo>
+                  <a:lnTo>
+                    <a:pt x="1369" y="8744"/>
+                  </a:lnTo>
+                  <a:lnTo>
+                    <a:pt x="1906" y="9526"/>
+                  </a:lnTo>
+                  <a:lnTo>
+                    <a:pt x="2150" y="9941"/>
+                  </a:lnTo>
+                  <a:lnTo>
+                    <a:pt x="2394" y="10356"/>
+                  </a:lnTo>
+                  <a:lnTo>
+                    <a:pt x="2614" y="10796"/>
+                  </a:lnTo>
+                  <a:lnTo>
+                    <a:pt x="2810" y="11284"/>
+                  </a:lnTo>
+                  <a:lnTo>
+                    <a:pt x="2980" y="11797"/>
+                  </a:lnTo>
+                  <a:lnTo>
+                    <a:pt x="3103" y="12334"/>
+                  </a:lnTo>
+                  <a:lnTo>
+                    <a:pt x="4079" y="12334"/>
+                  </a:lnTo>
+                  <a:lnTo>
+                    <a:pt x="3249" y="8500"/>
+                  </a:lnTo>
+                  <a:lnTo>
+                    <a:pt x="2663" y="5642"/>
+                  </a:lnTo>
+                  <a:lnTo>
+                    <a:pt x="2663" y="5520"/>
+                  </a:lnTo>
+                  <a:lnTo>
+                    <a:pt x="2712" y="5423"/>
+                  </a:lnTo>
+                  <a:lnTo>
+                    <a:pt x="2785" y="5374"/>
+                  </a:lnTo>
+                  <a:lnTo>
+                    <a:pt x="2883" y="5349"/>
+                  </a:lnTo>
+                  <a:lnTo>
+                    <a:pt x="2956" y="5349"/>
+                  </a:lnTo>
+                  <a:lnTo>
+                    <a:pt x="3054" y="5398"/>
+                  </a:lnTo>
+                  <a:lnTo>
+                    <a:pt x="4031" y="6253"/>
+                  </a:lnTo>
+                  <a:lnTo>
+                    <a:pt x="4983" y="5398"/>
+                  </a:lnTo>
+                  <a:lnTo>
+                    <a:pt x="5081" y="5349"/>
+                  </a:lnTo>
+                  <a:lnTo>
+                    <a:pt x="5227" y="5349"/>
+                  </a:lnTo>
+                  <a:lnTo>
+                    <a:pt x="5325" y="5398"/>
+                  </a:lnTo>
+                  <a:lnTo>
+                    <a:pt x="6278" y="6253"/>
+                  </a:lnTo>
+                  <a:lnTo>
+                    <a:pt x="7254" y="5398"/>
+                  </a:lnTo>
+                  <a:lnTo>
+                    <a:pt x="7352" y="5349"/>
+                  </a:lnTo>
+                  <a:lnTo>
+                    <a:pt x="7425" y="5349"/>
+                  </a:lnTo>
+                  <a:lnTo>
+                    <a:pt x="7523" y="5374"/>
+                  </a:lnTo>
+                  <a:lnTo>
+                    <a:pt x="7596" y="5423"/>
+                  </a:lnTo>
+                  <a:lnTo>
+                    <a:pt x="7645" y="5520"/>
+                  </a:lnTo>
+                  <a:lnTo>
+                    <a:pt x="7645" y="5642"/>
+                  </a:lnTo>
+                  <a:lnTo>
+                    <a:pt x="7059" y="8500"/>
+                  </a:lnTo>
+                  <a:lnTo>
+                    <a:pt x="6229" y="12334"/>
+                  </a:lnTo>
+                  <a:lnTo>
+                    <a:pt x="7206" y="12334"/>
+                  </a:lnTo>
+                  <a:lnTo>
+                    <a:pt x="7328" y="11797"/>
+                  </a:lnTo>
+                  <a:lnTo>
+                    <a:pt x="7499" y="11284"/>
+                  </a:lnTo>
+                  <a:lnTo>
+                    <a:pt x="7694" y="10796"/>
+                  </a:lnTo>
+                  <a:lnTo>
+                    <a:pt x="7914" y="10356"/>
+                  </a:lnTo>
+                  <a:lnTo>
+                    <a:pt x="8158" y="9941"/>
+                  </a:lnTo>
+                  <a:lnTo>
+                    <a:pt x="8402" y="9526"/>
+                  </a:lnTo>
+                  <a:lnTo>
+                    <a:pt x="8940" y="8744"/>
+                  </a:lnTo>
+                  <a:lnTo>
+                    <a:pt x="9208" y="8353"/>
+                  </a:lnTo>
+                  <a:lnTo>
+                    <a:pt x="9453" y="7963"/>
+                  </a:lnTo>
+                  <a:lnTo>
+                    <a:pt x="9672" y="7572"/>
+                  </a:lnTo>
+                  <a:lnTo>
+                    <a:pt x="9892" y="7132"/>
+                  </a:lnTo>
+                  <a:lnTo>
+                    <a:pt x="10063" y="6693"/>
+                  </a:lnTo>
+                  <a:lnTo>
+                    <a:pt x="10185" y="6204"/>
+                  </a:lnTo>
+                  <a:lnTo>
+                    <a:pt x="10259" y="5691"/>
+                  </a:lnTo>
+                  <a:lnTo>
+                    <a:pt x="10283" y="5423"/>
+                  </a:lnTo>
+                  <a:lnTo>
+                    <a:pt x="10307" y="5154"/>
+                  </a:lnTo>
+                  <a:lnTo>
+                    <a:pt x="10259" y="4617"/>
+                  </a:lnTo>
+                  <a:lnTo>
+                    <a:pt x="10185" y="4104"/>
+                  </a:lnTo>
+                  <a:lnTo>
+                    <a:pt x="10063" y="3615"/>
+                  </a:lnTo>
+                  <a:lnTo>
+                    <a:pt x="9892" y="3151"/>
+                  </a:lnTo>
+                  <a:lnTo>
+                    <a:pt x="9672" y="2687"/>
+                  </a:lnTo>
+                  <a:lnTo>
+                    <a:pt x="9428" y="2272"/>
+                  </a:lnTo>
+                  <a:lnTo>
+                    <a:pt x="9111" y="1881"/>
+                  </a:lnTo>
+                  <a:lnTo>
+                    <a:pt x="8793" y="1515"/>
+                  </a:lnTo>
+                  <a:lnTo>
+                    <a:pt x="8427" y="1173"/>
+                  </a:lnTo>
+                  <a:lnTo>
+                    <a:pt x="8036" y="880"/>
+                  </a:lnTo>
+                  <a:lnTo>
+                    <a:pt x="7596" y="636"/>
+                  </a:lnTo>
+                  <a:lnTo>
+                    <a:pt x="7157" y="416"/>
+                  </a:lnTo>
+                  <a:lnTo>
+                    <a:pt x="6693" y="245"/>
+                  </a:lnTo>
+                  <a:lnTo>
+                    <a:pt x="6180" y="98"/>
+                  </a:lnTo>
+                  <a:lnTo>
+                    <a:pt x="5691" y="25"/>
+                  </a:lnTo>
+                  <a:lnTo>
+                    <a:pt x="5154" y="1"/>
+                  </a:lnTo>
+                  <a:close/>
+                </a:path>
+              </a:pathLst>
+            </a:custGeom>
+            <a:solidFill>
+              <a:srgbClr val="FF9E00"/>
+            </a:solidFill>
+            <a:ln>
+              <a:noFill/>
+            </a:ln>
+          </p:spPr>
+          <p:txBody>
+            <a:bodyPr spcFirstLastPara="1" wrap="square" lIns="121900" tIns="121900" rIns="121900" bIns="121900" anchor="ctr" anchorCtr="0">
+              <a:noAutofit/>
+            </a:bodyPr>
+            <a:lstStyle/>
+            <a:p>
+              <a:endParaRPr sz="2400">
+                <a:solidFill>
+                  <a:srgbClr val="FFFFFF"/>
+                </a:solidFill>
+              </a:endParaRPr>
+            </a:p>
+          </p:txBody>
+        </p:sp>
+      </p:grpSp>
+    </p:spTree>
+    <p:extLst>
+      <p:ext uri="{BB962C8B-B14F-4D97-AF65-F5344CB8AC3E}">
+        <p14:creationId xmlns:p14="http://schemas.microsoft.com/office/powerpoint/2010/main" val="2733470961"/>
+      </p:ext>
+    </p:extLst>
+  </p:cSld>
+  <p:clrMapOvr>
+    <a:masterClrMapping/>
+  </p:clrMapOvr>
+  <p:timing>
+    <p:tnLst>
+      <p:par>
+        <p:cTn id="1" dur="indefinite" restart="never" nodeType="tmRoot"/>
+      </p:par>
+    </p:tnLst>
+  </p:timing>
+</p:sld>
+</file>
+
+<file path=ppt/slides/slide27.xml><?xml version="1.0" encoding="utf-8"?>
+<p:sld xmlns:a="http://schemas.openxmlformats.org/drawingml/2006/main" xmlns:r="http://schemas.openxmlformats.org/officeDocument/2006/relationships" xmlns:p="http://schemas.openxmlformats.org/presentationml/2006/main">
+  <p:cSld>
+    <p:spTree>
+      <p:nvGrpSpPr>
+        <p:cNvPr id="1" name=""/>
+        <p:cNvGrpSpPr/>
+        <p:nvPr/>
+      </p:nvGrpSpPr>
+      <p:grpSpPr>
+        <a:xfrm>
+          <a:off x="0" y="0"/>
+          <a:ext cx="0" cy="0"/>
+          <a:chOff x="0" y="0"/>
+          <a:chExt cx="0" cy="0"/>
+        </a:xfrm>
+      </p:grpSpPr>
+      <p:sp>
+        <p:nvSpPr>
+          <p:cNvPr id="6" name="양쪽 모서리가 둥근 사각형 5"/>
+          <p:cNvSpPr/>
+          <p:nvPr/>
+        </p:nvSpPr>
+        <p:spPr>
+          <a:xfrm>
+            <a:off x="143339" y="548680"/>
+            <a:ext cx="11905323" cy="6144683"/>
+          </a:xfrm>
+          <a:prstGeom prst="round2SameRect">
+            <a:avLst>
+              <a:gd name="adj1" fmla="val 0"/>
+              <a:gd name="adj2" fmla="val 2405"/>
+            </a:avLst>
+          </a:prstGeom>
+          <a:solidFill>
+            <a:schemeClr val="bg1"/>
+          </a:solidFill>
+          <a:ln>
+            <a:noFill/>
+          </a:ln>
+          <a:effectLst>
+            <a:outerShdw dist="254000" dir="5400000" sx="97000" sy="97000" algn="t" rotWithShape="0">
+              <a:prstClr val="black">
+                <a:alpha val="40000"/>
+              </a:prstClr>
+            </a:outerShdw>
+          </a:effectLst>
+        </p:spPr>
+        <p:style>
+          <a:lnRef idx="2">
+            <a:schemeClr val="accent1">
+              <a:shade val="50000"/>
+            </a:schemeClr>
+          </a:lnRef>
+          <a:fillRef idx="1">
+            <a:schemeClr val="accent1"/>
+          </a:fillRef>
+          <a:effectRef idx="0">
+            <a:schemeClr val="accent1"/>
+          </a:effectRef>
+          <a:fontRef idx="minor">
+            <a:schemeClr val="lt1"/>
+          </a:fontRef>
+        </p:style>
+        <p:txBody>
+          <a:bodyPr lIns="91438" tIns="45719" rIns="91438" bIns="45719" rtlCol="0" anchor="ctr"/>
+          <a:lstStyle/>
+          <a:p>
+            <a:pPr algn="ctr"/>
+            <a:endParaRPr lang="ko-KR" altLang="en-US">
+              <a:solidFill>
+                <a:prstClr val="white"/>
+              </a:solidFill>
+            </a:endParaRPr>
+          </a:p>
+        </p:txBody>
+      </p:sp>
+      <p:sp>
+        <p:nvSpPr>
+          <p:cNvPr id="5" name="양쪽 모서리가 둥근 사각형 4"/>
+          <p:cNvSpPr/>
+          <p:nvPr/>
+        </p:nvSpPr>
+        <p:spPr>
+          <a:xfrm>
+            <a:off x="143339" y="243880"/>
+            <a:ext cx="11905323" cy="304800"/>
+          </a:xfrm>
+          <a:prstGeom prst="round2SameRect">
+            <a:avLst>
+              <a:gd name="adj1" fmla="val 44667"/>
+              <a:gd name="adj2" fmla="val 0"/>
+            </a:avLst>
+          </a:prstGeom>
+          <a:solidFill>
+            <a:srgbClr val="411F42"/>
+          </a:solidFill>
+          <a:ln>
+            <a:noFill/>
+          </a:ln>
+          <a:effectLst>
+            <a:outerShdw dist="76200" dir="16200000" sx="97000" sy="97000" rotWithShape="0">
+              <a:prstClr val="black">
+                <a:alpha val="40000"/>
+              </a:prstClr>
+            </a:outerShdw>
+          </a:effectLst>
+        </p:spPr>
+        <p:style>
+          <a:lnRef idx="2">
+            <a:schemeClr val="accent1">
+              <a:shade val="50000"/>
+            </a:schemeClr>
+          </a:lnRef>
+          <a:fillRef idx="1">
+            <a:schemeClr val="accent1"/>
+          </a:fillRef>
+          <a:effectRef idx="0">
+            <a:schemeClr val="accent1"/>
+          </a:effectRef>
+          <a:fontRef idx="minor">
+            <a:schemeClr val="lt1"/>
+          </a:fontRef>
+        </p:style>
+        <p:txBody>
+          <a:bodyPr lIns="91438" tIns="45719" rIns="91438" bIns="45719" rtlCol="0" anchor="ctr"/>
+          <a:lstStyle/>
+          <a:p>
+            <a:pPr algn="ctr"/>
+            <a:endParaRPr lang="ko-KR" altLang="en-US">
+              <a:solidFill>
+                <a:prstClr val="white"/>
+              </a:solidFill>
+            </a:endParaRPr>
+          </a:p>
+        </p:txBody>
+      </p:sp>
+      <p:sp>
+        <p:nvSpPr>
+          <p:cNvPr id="7" name="직사각형 6"/>
+          <p:cNvSpPr/>
+          <p:nvPr/>
+        </p:nvSpPr>
+        <p:spPr>
+          <a:xfrm>
+            <a:off x="935120" y="366664"/>
+            <a:ext cx="10613801" cy="72000"/>
+          </a:xfrm>
+          <a:prstGeom prst="rect">
+            <a:avLst/>
+          </a:prstGeom>
+          <a:solidFill>
+            <a:schemeClr val="bg1"/>
+          </a:solidFill>
+          <a:ln>
+            <a:noFill/>
+          </a:ln>
+        </p:spPr>
+        <p:style>
+          <a:lnRef idx="2">
+            <a:schemeClr val="accent1">
+              <a:shade val="50000"/>
+            </a:schemeClr>
+          </a:lnRef>
+          <a:fillRef idx="1">
+            <a:schemeClr val="accent1"/>
+          </a:fillRef>
+          <a:effectRef idx="0">
+            <a:schemeClr val="accent1"/>
+          </a:effectRef>
+          <a:fontRef idx="minor">
+            <a:schemeClr val="lt1"/>
+          </a:fontRef>
+        </p:style>
+        <p:txBody>
+          <a:bodyPr lIns="91438" tIns="45719" rIns="91438" bIns="45719" rtlCol="0" anchor="ctr"/>
+          <a:lstStyle/>
+          <a:p>
+            <a:pPr algn="ctr"/>
+            <a:endParaRPr lang="ko-KR" altLang="en-US">
+              <a:solidFill>
+                <a:prstClr val="white"/>
+              </a:solidFill>
+            </a:endParaRPr>
+          </a:p>
+        </p:txBody>
+      </p:sp>
+      <p:sp>
+        <p:nvSpPr>
+          <p:cNvPr id="8" name="타원 7"/>
+          <p:cNvSpPr/>
+          <p:nvPr/>
+        </p:nvSpPr>
+        <p:spPr>
+          <a:xfrm>
+            <a:off x="576949" y="366664"/>
+            <a:ext cx="75276" cy="72000"/>
+          </a:xfrm>
+          <a:prstGeom prst="ellipse">
+            <a:avLst/>
+          </a:prstGeom>
+          <a:solidFill>
+            <a:srgbClr val="FF6189"/>
+          </a:solidFill>
+          <a:ln>
+            <a:noFill/>
+          </a:ln>
+        </p:spPr>
+        <p:style>
+          <a:lnRef idx="2">
+            <a:schemeClr val="accent1">
+              <a:shade val="50000"/>
+            </a:schemeClr>
+          </a:lnRef>
+          <a:fillRef idx="1">
+            <a:schemeClr val="accent1"/>
+          </a:fillRef>
+          <a:effectRef idx="0">
+            <a:schemeClr val="accent1"/>
+          </a:effectRef>
+          <a:fontRef idx="minor">
+            <a:schemeClr val="lt1"/>
+          </a:fontRef>
+        </p:style>
+        <p:txBody>
+          <a:bodyPr lIns="91438" tIns="45719" rIns="91438" bIns="45719" rtlCol="0" anchor="ctr"/>
+          <a:lstStyle/>
+          <a:p>
+            <a:pPr algn="ctr"/>
+            <a:endParaRPr lang="ko-KR" altLang="en-US">
+              <a:solidFill>
+                <a:prstClr val="white"/>
+              </a:solidFill>
+            </a:endParaRPr>
+          </a:p>
+        </p:txBody>
+      </p:sp>
+      <p:sp>
+        <p:nvSpPr>
+          <p:cNvPr id="9" name="타원 8"/>
+          <p:cNvSpPr/>
+          <p:nvPr/>
+        </p:nvSpPr>
+        <p:spPr>
+          <a:xfrm>
+            <a:off x="766826" y="366664"/>
+            <a:ext cx="75276" cy="72000"/>
+          </a:xfrm>
+          <a:prstGeom prst="ellipse">
+            <a:avLst/>
+          </a:prstGeom>
+          <a:solidFill>
+            <a:srgbClr val="00B0F0"/>
+          </a:solidFill>
+          <a:ln>
+            <a:noFill/>
+          </a:ln>
+        </p:spPr>
+        <p:style>
+          <a:lnRef idx="2">
+            <a:schemeClr val="accent1">
+              <a:shade val="50000"/>
+            </a:schemeClr>
+          </a:lnRef>
+          <a:fillRef idx="1">
+            <a:schemeClr val="accent1"/>
+          </a:fillRef>
+          <a:effectRef idx="0">
+            <a:schemeClr val="accent1"/>
+          </a:effectRef>
+          <a:fontRef idx="minor">
+            <a:schemeClr val="lt1"/>
+          </a:fontRef>
+        </p:style>
+        <p:txBody>
+          <a:bodyPr lIns="91438" tIns="45719" rIns="91438" bIns="45719" rtlCol="0" anchor="ctr"/>
+          <a:lstStyle/>
+          <a:p>
+            <a:pPr algn="ctr"/>
+            <a:endParaRPr lang="ko-KR" altLang="en-US">
+              <a:solidFill>
+                <a:prstClr val="white"/>
+              </a:solidFill>
+            </a:endParaRPr>
+          </a:p>
+        </p:txBody>
+      </p:sp>
+      <p:sp>
+        <p:nvSpPr>
+          <p:cNvPr id="10" name="타원 9"/>
+          <p:cNvSpPr/>
+          <p:nvPr/>
+        </p:nvSpPr>
+        <p:spPr>
+          <a:xfrm>
+            <a:off x="956703" y="366664"/>
+            <a:ext cx="75276" cy="72000"/>
+          </a:xfrm>
+          <a:prstGeom prst="ellipse">
+            <a:avLst/>
+          </a:prstGeom>
+          <a:solidFill>
+            <a:schemeClr val="accent4"/>
+          </a:solidFill>
+          <a:ln>
+            <a:noFill/>
+          </a:ln>
+        </p:spPr>
+        <p:style>
+          <a:lnRef idx="2">
+            <a:schemeClr val="accent1">
+              <a:shade val="50000"/>
+            </a:schemeClr>
+          </a:lnRef>
+          <a:fillRef idx="1">
+            <a:schemeClr val="accent1"/>
+          </a:fillRef>
+          <a:effectRef idx="0">
+            <a:schemeClr val="accent1"/>
+          </a:effectRef>
+          <a:fontRef idx="minor">
+            <a:schemeClr val="lt1"/>
+          </a:fontRef>
+        </p:style>
+        <p:txBody>
+          <a:bodyPr lIns="91438" tIns="45719" rIns="91438" bIns="45719" rtlCol="0" anchor="ctr"/>
+          <a:lstStyle/>
+          <a:p>
+            <a:pPr algn="ctr"/>
+            <a:endParaRPr lang="ko-KR" altLang="en-US">
+              <a:solidFill>
+                <a:prstClr val="white"/>
+              </a:solidFill>
+            </a:endParaRPr>
+          </a:p>
+        </p:txBody>
+      </p:sp>
+      <p:sp>
+        <p:nvSpPr>
+          <p:cNvPr id="12" name="직사각형 11"/>
+          <p:cNvSpPr/>
+          <p:nvPr/>
+        </p:nvSpPr>
+        <p:spPr>
+          <a:xfrm>
+            <a:off x="1871531" y="626201"/>
+            <a:ext cx="10108802" cy="646329"/>
+          </a:xfrm>
+          <a:prstGeom prst="rect">
+            <a:avLst/>
+          </a:prstGeom>
+        </p:spPr>
+        <p:txBody>
+          <a:bodyPr wrap="square" lIns="91438" tIns="45719" rIns="91438" bIns="45719">
+            <a:spAutoFit/>
+          </a:bodyPr>
+          <a:lstStyle/>
+          <a:p>
+            <a:pPr>
+              <a:lnSpc>
+                <a:spcPct val="150000"/>
+              </a:lnSpc>
+            </a:pPr>
+            <a:r>
+              <a:rPr lang="en-US" altLang="ko-KR" sz="2400" b="1" dirty="0" smtClean="0">
+                <a:solidFill>
+                  <a:schemeClr val="tx1">
+                    <a:lumMod val="75000"/>
+                    <a:lumOff val="25000"/>
+                  </a:schemeClr>
+                </a:solidFill>
+                <a:latin typeface="+mj-ea"/>
+                <a:ea typeface="+mj-ea"/>
+              </a:rPr>
+              <a:t>[ </a:t>
+            </a:r>
+            <a:r>
+              <a:rPr lang="ko-KR" altLang="en-US" sz="2400" b="1" dirty="0" err="1" smtClean="0">
+                <a:solidFill>
+                  <a:schemeClr val="tx1">
+                    <a:lumMod val="75000"/>
+                    <a:lumOff val="25000"/>
+                  </a:schemeClr>
+                </a:solidFill>
+                <a:latin typeface="+mj-ea"/>
+                <a:ea typeface="+mj-ea"/>
+              </a:rPr>
+              <a:t>통합테스트</a:t>
+            </a:r>
+            <a:r>
+              <a:rPr lang="ko-KR" altLang="en-US" sz="2400" b="1" dirty="0" smtClean="0">
+                <a:solidFill>
+                  <a:schemeClr val="tx1">
+                    <a:lumMod val="75000"/>
+                    <a:lumOff val="25000"/>
+                  </a:schemeClr>
+                </a:solidFill>
+                <a:latin typeface="+mj-ea"/>
+                <a:ea typeface="+mj-ea"/>
+              </a:rPr>
+              <a:t> </a:t>
+            </a:r>
+            <a:r>
+              <a:rPr lang="en-US" altLang="ko-KR" sz="2400" b="1" dirty="0" smtClean="0">
+                <a:solidFill>
+                  <a:schemeClr val="tx1">
+                    <a:lumMod val="75000"/>
+                    <a:lumOff val="25000"/>
+                  </a:schemeClr>
+                </a:solidFill>
+                <a:latin typeface="+mj-ea"/>
+                <a:ea typeface="+mj-ea"/>
+              </a:rPr>
+              <a:t>] </a:t>
+            </a:r>
+            <a:r>
+              <a:rPr lang="ko-KR" altLang="en-US" sz="2400" b="1" dirty="0" err="1" smtClean="0">
+                <a:solidFill>
+                  <a:schemeClr val="tx1">
+                    <a:lumMod val="75000"/>
+                    <a:lumOff val="25000"/>
+                  </a:schemeClr>
+                </a:solidFill>
+                <a:latin typeface="+mj-ea"/>
+                <a:ea typeface="+mj-ea"/>
+              </a:rPr>
+              <a:t>마이페이지</a:t>
+            </a:r>
+            <a:endParaRPr lang="ko-KR" altLang="en-US" sz="2000" b="1" dirty="0">
+              <a:solidFill>
+                <a:schemeClr val="tx1">
+                  <a:lumMod val="75000"/>
+                  <a:lumOff val="25000"/>
+                </a:schemeClr>
+              </a:solidFill>
+              <a:latin typeface="+mj-ea"/>
+              <a:ea typeface="+mj-ea"/>
+            </a:endParaRPr>
+          </a:p>
+        </p:txBody>
+      </p:sp>
+      <p:pic>
+        <p:nvPicPr>
+          <p:cNvPr id="13" name="Picture 2"/>
+          <p:cNvPicPr>
+            <a:picLocks noChangeAspect="1" noChangeArrowheads="1"/>
+          </p:cNvPicPr>
+          <p:nvPr/>
+        </p:nvPicPr>
+        <p:blipFill>
+          <a:blip r:embed="rId2" cstate="print">
+            <a:extLst>
+              <a:ext uri="{28A0092B-C50C-407E-A947-70E740481C1C}">
+                <a14:useLocalDpi xmlns:a14="http://schemas.microsoft.com/office/drawing/2010/main" val="0"/>
+              </a:ext>
+            </a:extLst>
+          </a:blip>
+          <a:srcRect/>
+          <a:stretch>
+            <a:fillRect/>
+          </a:stretch>
+        </p:blipFill>
+        <p:spPr bwMode="auto">
+          <a:xfrm>
+            <a:off x="697918" y="557711"/>
+            <a:ext cx="1151805" cy="767120"/>
+          </a:xfrm>
+          <a:prstGeom prst="rect">
+            <a:avLst/>
+          </a:prstGeom>
+          <a:noFill/>
+          <a:ln>
+            <a:noFill/>
+          </a:ln>
+          <a:extLst>
+            <a:ext uri="{909E8E84-426E-40DD-AFC4-6F175D3DCCD1}">
+              <a14:hiddenFill xmlns:a14="http://schemas.microsoft.com/office/drawing/2010/main">
+                <a:solidFill>
+                  <a:schemeClr val="accent1"/>
+                </a:solidFill>
+              </a14:hiddenFill>
+            </a:ext>
+            <a:ext uri="{91240B29-F687-4F45-9708-019B960494DF}">
+              <a14:hiddenLine xmlns:a14="http://schemas.microsoft.com/office/drawing/2010/main" w="9525">
+                <a:solidFill>
+                  <a:schemeClr val="tx1"/>
+                </a:solidFill>
+                <a:miter lim="800000"/>
+                <a:headEnd/>
+                <a:tailEnd/>
+              </a14:hiddenLine>
+            </a:ext>
+          </a:extLst>
+        </p:spPr>
+      </p:pic>
+      <p:graphicFrame>
+        <p:nvGraphicFramePr>
+          <p:cNvPr id="14" name="표 13"/>
+          <p:cNvGraphicFramePr>
+            <a:graphicFrameLocks noGrp="1"/>
+          </p:cNvGraphicFramePr>
+          <p:nvPr>
+            <p:extLst>
+              <p:ext uri="{D42A27DB-BD31-4B8C-83A1-F6EECF244321}">
+                <p14:modId xmlns:p14="http://schemas.microsoft.com/office/powerpoint/2010/main" val="3822938080"/>
+              </p:ext>
+            </p:extLst>
+          </p:nvPr>
+        </p:nvGraphicFramePr>
+        <p:xfrm>
+          <a:off x="842102" y="1402352"/>
+          <a:ext cx="10706820" cy="4805310"/>
+        </p:xfrm>
+        <a:graphic>
+          <a:graphicData uri="http://schemas.openxmlformats.org/drawingml/2006/table">
+            <a:tbl>
+              <a:tblPr/>
+              <a:tblGrid>
+                <a:gridCol w="1953852">
+                  <a:extLst>
+                    <a:ext uri="{9D8B030D-6E8A-4147-A177-3AD203B41FA5}">
+                      <a16:colId xmlns:a16="http://schemas.microsoft.com/office/drawing/2014/main" xmlns="" val="20001"/>
+                    </a:ext>
+                  </a:extLst>
+                </a:gridCol>
+                <a:gridCol w="3006969">
+                  <a:extLst>
+                    <a:ext uri="{9D8B030D-6E8A-4147-A177-3AD203B41FA5}">
+                      <a16:colId xmlns:a16="http://schemas.microsoft.com/office/drawing/2014/main" xmlns="" val="20002"/>
+                    </a:ext>
+                  </a:extLst>
+                </a:gridCol>
+                <a:gridCol w="2913367">
+                  <a:extLst>
+                    <a:ext uri="{9D8B030D-6E8A-4147-A177-3AD203B41FA5}">
+                      <a16:colId xmlns:a16="http://schemas.microsoft.com/office/drawing/2014/main" xmlns="" val="20003"/>
+                    </a:ext>
+                  </a:extLst>
+                </a:gridCol>
+                <a:gridCol w="2832632">
+                  <a:extLst>
+                    <a:ext uri="{9D8B030D-6E8A-4147-A177-3AD203B41FA5}">
+                      <a16:colId xmlns:a16="http://schemas.microsoft.com/office/drawing/2014/main" xmlns="" val="410757781"/>
+                    </a:ext>
+                  </a:extLst>
+                </a:gridCol>
+              </a:tblGrid>
+              <a:tr h="444765">
+                <a:tc>
+                  <a:txBody>
+                    <a:bodyPr/>
+                    <a:lstStyle/>
+                    <a:p>
+                      <a:pPr algn="ctr" fontAlgn="ctr"/>
+                      <a:r>
+                        <a:rPr lang="ko-KR" altLang="en-US" sz="1400" b="1" i="0" u="none" strike="noStrike" dirty="0" smtClean="0">
+                          <a:solidFill>
+                            <a:schemeClr val="bg1"/>
+                          </a:solidFill>
+                          <a:effectLst/>
+                          <a:latin typeface="나눔바른고딕" pitchFamily="50" charset="-127"/>
+                          <a:ea typeface="나눔바른고딕" pitchFamily="50" charset="-127"/>
+                        </a:rPr>
+                        <a:t>테스트 항목</a:t>
+                      </a:r>
+                      <a:endParaRPr lang="en-US" altLang="ko-KR" sz="1400" b="1" i="0" u="none" strike="noStrike" dirty="0">
+                        <a:solidFill>
+                          <a:schemeClr val="bg1"/>
+                        </a:solidFill>
+                        <a:effectLst/>
+                        <a:latin typeface="나눔바른고딕" pitchFamily="50" charset="-127"/>
+                        <a:ea typeface="나눔바른고딕" pitchFamily="50" charset="-127"/>
+                      </a:endParaRPr>
+                    </a:p>
+                  </a:txBody>
+                  <a:tcPr marL="5314" marR="5314" marT="5314" marB="0" anchor="ctr">
+                    <a:solidFill>
+                      <a:srgbClr val="FF9E00"/>
+                    </a:solidFill>
+                  </a:tcPr>
+                </a:tc>
+                <a:tc>
+                  <a:txBody>
+                    <a:bodyPr/>
+                    <a:lstStyle/>
+                    <a:p>
+                      <a:pPr algn="ctr" fontAlgn="ctr"/>
+                      <a:r>
+                        <a:rPr lang="ko-KR" altLang="en-US" sz="1400" b="1" u="none" strike="noStrike" dirty="0" err="1" smtClean="0">
+                          <a:solidFill>
+                            <a:schemeClr val="bg1"/>
+                          </a:solidFill>
+                          <a:effectLst/>
+                          <a:latin typeface="나눔바른고딕" pitchFamily="50" charset="-127"/>
+                          <a:ea typeface="나눔바른고딕" pitchFamily="50" charset="-127"/>
+                        </a:rPr>
+                        <a:t>기대결과</a:t>
+                      </a:r>
+                      <a:endParaRPr lang="ko-KR" altLang="en-US" sz="1400" b="1" i="0" u="none" strike="noStrike" dirty="0">
+                        <a:solidFill>
+                          <a:schemeClr val="bg1"/>
+                        </a:solidFill>
+                        <a:effectLst/>
+                        <a:latin typeface="나눔바른고딕" pitchFamily="50" charset="-127"/>
+                        <a:ea typeface="나눔바른고딕" pitchFamily="50" charset="-127"/>
+                      </a:endParaRPr>
+                    </a:p>
+                  </a:txBody>
+                  <a:tcPr marL="5314" marR="5314" marT="5314" marB="0" anchor="ctr">
+                    <a:solidFill>
+                      <a:srgbClr val="FF9E00"/>
+                    </a:solidFill>
+                  </a:tcPr>
+                </a:tc>
+                <a:tc>
+                  <a:txBody>
+                    <a:bodyPr/>
+                    <a:lstStyle/>
+                    <a:p>
+                      <a:pPr algn="ctr" fontAlgn="ctr"/>
+                      <a:r>
+                        <a:rPr lang="ko-KR" altLang="en-US" sz="1400" b="1" u="none" strike="noStrike" dirty="0" smtClean="0">
+                          <a:solidFill>
+                            <a:schemeClr val="bg1"/>
+                          </a:solidFill>
+                          <a:effectLst/>
+                          <a:latin typeface="나눔바른고딕" pitchFamily="50" charset="-127"/>
+                          <a:ea typeface="나눔바른고딕" pitchFamily="50" charset="-127"/>
+                        </a:rPr>
+                        <a:t>테스트 결과</a:t>
+                      </a:r>
+                      <a:endParaRPr lang="ko-KR" altLang="en-US" sz="1400" b="1" i="0" u="none" strike="noStrike" dirty="0">
+                        <a:solidFill>
+                          <a:schemeClr val="bg1"/>
+                        </a:solidFill>
+                        <a:effectLst/>
+                        <a:latin typeface="나눔바른고딕" pitchFamily="50" charset="-127"/>
+                        <a:ea typeface="나눔바른고딕" pitchFamily="50" charset="-127"/>
+                      </a:endParaRPr>
+                    </a:p>
+                  </a:txBody>
+                  <a:tcPr marL="5314" marR="5314" marT="5314" marB="0" anchor="ctr">
+                    <a:solidFill>
+                      <a:srgbClr val="FF9E00"/>
+                    </a:solidFill>
+                  </a:tcPr>
+                </a:tc>
+                <a:tc>
+                  <a:txBody>
+                    <a:bodyPr/>
+                    <a:lstStyle/>
+                    <a:p>
+                      <a:pPr algn="ctr" fontAlgn="ctr"/>
+                      <a:r>
+                        <a:rPr lang="ko-KR" altLang="en-US" sz="1400" b="1" i="0" u="none" strike="noStrike" dirty="0" smtClean="0">
+                          <a:solidFill>
+                            <a:schemeClr val="bg1"/>
+                          </a:solidFill>
+                          <a:effectLst/>
+                          <a:latin typeface="나눔바른고딕" pitchFamily="50" charset="-127"/>
+                          <a:ea typeface="나눔바른고딕" pitchFamily="50" charset="-127"/>
+                        </a:rPr>
+                        <a:t>수정 및 결과</a:t>
+                      </a:r>
+                      <a:endParaRPr lang="ko-KR" altLang="en-US" sz="1400" b="1" i="0" u="none" strike="noStrike" dirty="0">
+                        <a:solidFill>
+                          <a:schemeClr val="bg1"/>
+                        </a:solidFill>
+                        <a:effectLst/>
+                        <a:latin typeface="나눔바른고딕" pitchFamily="50" charset="-127"/>
+                        <a:ea typeface="나눔바른고딕" pitchFamily="50" charset="-127"/>
+                      </a:endParaRPr>
+                    </a:p>
+                  </a:txBody>
+                  <a:tcPr marL="5314" marR="5314" marT="5314" marB="0" anchor="ctr">
+                    <a:solidFill>
+                      <a:srgbClr val="FF9E00"/>
+                    </a:solidFill>
+                  </a:tcPr>
+                </a:tc>
+                <a:extLst>
+                  <a:ext uri="{0D108BD9-81ED-4DB2-BD59-A6C34878D82A}">
+                    <a16:rowId xmlns:a16="http://schemas.microsoft.com/office/drawing/2014/main" xmlns="" val="10000"/>
+                  </a:ext>
+                </a:extLst>
+              </a:tr>
+              <a:tr h="1541341">
+                <a:tc>
+                  <a:txBody>
+                    <a:bodyPr/>
+                    <a:lstStyle/>
+                    <a:p>
+                      <a:pPr algn="ctr" fontAlgn="ctr" latinLnBrk="0"/>
+                      <a:r>
+                        <a:rPr lang="ko-KR" altLang="en-US" sz="1200" b="1" i="0" u="none" strike="noStrike" smtClean="0">
+                          <a:solidFill>
+                            <a:srgbClr val="000000"/>
+                          </a:solidFill>
+                          <a:effectLst/>
+                          <a:latin typeface="맑은 고딕" panose="020B0503020000020004" pitchFamily="50" charset="-127"/>
+                          <a:ea typeface="나눔바른고딕" panose="020B0603020101020101"/>
+                        </a:rPr>
+                        <a:t>마이페이지 </a:t>
+                      </a:r>
+                      <a:r>
+                        <a:rPr lang="en-US" altLang="ko-KR" sz="1200" b="1" i="0" u="none" strike="noStrike" smtClean="0">
+                          <a:solidFill>
+                            <a:srgbClr val="000000"/>
+                          </a:solidFill>
+                          <a:effectLst/>
+                          <a:latin typeface="맑은 고딕" panose="020B0503020000020004" pitchFamily="50" charset="-127"/>
+                          <a:ea typeface="나눔바른고딕" panose="020B0603020101020101"/>
+                        </a:rPr>
+                        <a:t>&gt; </a:t>
+                      </a:r>
+                      <a:r>
+                        <a:rPr lang="ko-KR" altLang="en-US" sz="1200" b="1" i="0" u="none" strike="noStrike" smtClean="0">
+                          <a:solidFill>
+                            <a:srgbClr val="000000"/>
+                          </a:solidFill>
+                          <a:effectLst/>
+                          <a:latin typeface="맑은 고딕" panose="020B0503020000020004" pitchFamily="50" charset="-127"/>
+                          <a:ea typeface="나눔바른고딕" panose="020B0603020101020101"/>
+                        </a:rPr>
+                        <a:t>주문지 정보 수정</a:t>
+                      </a:r>
+                      <a:endParaRPr lang="ko-KR" altLang="en-US" sz="1200" b="1" i="0" u="none" strike="noStrike" dirty="0">
+                        <a:solidFill>
+                          <a:srgbClr val="000000"/>
+                        </a:solidFill>
+                        <a:effectLst/>
+                        <a:latin typeface="맑은 고딕" panose="020B0503020000020004" pitchFamily="50" charset="-127"/>
+                        <a:ea typeface="나눔바른고딕" panose="020B0603020101020101"/>
+                      </a:endParaRPr>
+                    </a:p>
+                  </a:txBody>
+                  <a:tcPr marL="9525" marR="9525" marT="9525" marB="0" anchor="ctr">
+                    <a:solidFill>
+                      <a:schemeClr val="bg1"/>
+                    </a:solidFill>
+                  </a:tcPr>
+                </a:tc>
+                <a:tc>
+                  <a:txBody>
+                    <a:bodyPr/>
+                    <a:lstStyle/>
+                    <a:p>
+                      <a:pPr marL="0" indent="0" algn="l" fontAlgn="ctr" latinLnBrk="0">
+                        <a:buFont typeface="Arial" panose="020B0604020202020204" pitchFamily="34" charset="0"/>
+                        <a:buNone/>
+                      </a:pPr>
+                      <a:r>
+                        <a:rPr lang="en-US" altLang="ko-KR" sz="1200" b="1" i="0" u="none" strike="noStrike" baseline="0" dirty="0" smtClean="0">
+                          <a:solidFill>
+                            <a:schemeClr val="tx1"/>
+                          </a:solidFill>
+                          <a:effectLst/>
+                          <a:latin typeface="+mn-ea"/>
+                          <a:ea typeface="나눔바른고딕" panose="020B0603020101020101"/>
+                        </a:rPr>
+                        <a:t>1. </a:t>
+                      </a:r>
+                      <a:r>
+                        <a:rPr lang="ko-KR" altLang="en-US" sz="1200" b="1" i="0" u="none" strike="noStrike" baseline="0" dirty="0" smtClean="0">
+                          <a:solidFill>
+                            <a:schemeClr val="tx1"/>
+                          </a:solidFill>
+                          <a:effectLst/>
+                          <a:latin typeface="+mn-ea"/>
+                          <a:ea typeface="나눔바른고딕" panose="020B0603020101020101"/>
+                        </a:rPr>
+                        <a:t>주문지 정보 수정 </a:t>
+                      </a:r>
+                      <a:r>
+                        <a:rPr lang="ko-KR" altLang="en-US" sz="1200" b="1" i="0" u="none" strike="noStrike" baseline="0" dirty="0" err="1" smtClean="0">
+                          <a:solidFill>
+                            <a:schemeClr val="tx1"/>
+                          </a:solidFill>
+                          <a:effectLst/>
+                          <a:latin typeface="+mn-ea"/>
+                          <a:ea typeface="나눔바른고딕" panose="020B0603020101020101"/>
+                        </a:rPr>
+                        <a:t>클릭시</a:t>
+                      </a:r>
+                      <a:r>
+                        <a:rPr lang="ko-KR" altLang="en-US" sz="1200" b="1" i="0" u="none" strike="noStrike" baseline="0" dirty="0" smtClean="0">
+                          <a:solidFill>
+                            <a:schemeClr val="tx1"/>
+                          </a:solidFill>
+                          <a:effectLst/>
+                          <a:latin typeface="+mn-ea"/>
+                          <a:ea typeface="나눔바른고딕" panose="020B0603020101020101"/>
+                        </a:rPr>
+                        <a:t> 주문지 정보 </a:t>
+                      </a:r>
+                      <a:r>
+                        <a:rPr lang="ko-KR" altLang="en-US" sz="1200" b="1" i="0" u="none" strike="noStrike" baseline="0" dirty="0" err="1" smtClean="0">
+                          <a:solidFill>
+                            <a:schemeClr val="tx1"/>
+                          </a:solidFill>
+                          <a:effectLst/>
+                          <a:latin typeface="+mn-ea"/>
+                          <a:ea typeface="나눔바른고딕" panose="020B0603020101020101"/>
+                        </a:rPr>
+                        <a:t>수정창에</a:t>
+                      </a:r>
+                      <a:r>
+                        <a:rPr lang="ko-KR" altLang="en-US" sz="1200" b="1" i="0" u="none" strike="noStrike" baseline="0" dirty="0" smtClean="0">
+                          <a:solidFill>
+                            <a:schemeClr val="tx1"/>
+                          </a:solidFill>
+                          <a:effectLst/>
+                          <a:latin typeface="+mn-ea"/>
+                          <a:ea typeface="나눔바른고딕" panose="020B0603020101020101"/>
+                        </a:rPr>
+                        <a:t> </a:t>
+                      </a:r>
+                      <a:r>
+                        <a:rPr lang="ko-KR" altLang="en-US" sz="1200" b="1" i="0" u="none" strike="noStrike" baseline="0" dirty="0" err="1" smtClean="0">
+                          <a:solidFill>
+                            <a:schemeClr val="tx1"/>
+                          </a:solidFill>
+                          <a:effectLst/>
+                          <a:latin typeface="+mn-ea"/>
+                          <a:ea typeface="나눔바른고딕" panose="020B0603020101020101"/>
+                        </a:rPr>
+                        <a:t>기등록된</a:t>
+                      </a:r>
+                      <a:r>
+                        <a:rPr lang="ko-KR" altLang="en-US" sz="1200" b="1" i="0" u="none" strike="noStrike" baseline="0" dirty="0" smtClean="0">
+                          <a:solidFill>
+                            <a:schemeClr val="tx1"/>
+                          </a:solidFill>
+                          <a:effectLst/>
+                          <a:latin typeface="+mn-ea"/>
+                          <a:ea typeface="나눔바른고딕" panose="020B0603020101020101"/>
+                        </a:rPr>
+                        <a:t> 주소 표시</a:t>
+                      </a:r>
+                    </a:p>
+                    <a:p>
+                      <a:pPr marL="0" indent="0" algn="l" fontAlgn="ctr" latinLnBrk="0">
+                        <a:buFont typeface="Arial" panose="020B0604020202020204" pitchFamily="34" charset="0"/>
+                        <a:buNone/>
+                      </a:pPr>
+                      <a:r>
+                        <a:rPr lang="en-US" altLang="ko-KR" sz="1200" b="1" i="0" u="none" strike="noStrike" baseline="0" dirty="0" smtClean="0">
+                          <a:solidFill>
+                            <a:schemeClr val="tx1"/>
+                          </a:solidFill>
+                          <a:effectLst/>
+                          <a:latin typeface="+mn-ea"/>
+                          <a:ea typeface="나눔바른고딕" panose="020B0603020101020101"/>
+                        </a:rPr>
+                        <a:t>2. </a:t>
+                      </a:r>
+                      <a:r>
+                        <a:rPr lang="ko-KR" altLang="en-US" sz="1200" b="1" i="0" u="none" strike="noStrike" baseline="0" dirty="0" smtClean="0">
+                          <a:solidFill>
+                            <a:schemeClr val="tx1"/>
+                          </a:solidFill>
+                          <a:effectLst/>
+                          <a:latin typeface="+mn-ea"/>
+                          <a:ea typeface="나눔바른고딕" panose="020B0603020101020101"/>
+                        </a:rPr>
+                        <a:t>새로운 주소 </a:t>
+                      </a:r>
+                      <a:r>
+                        <a:rPr lang="ko-KR" altLang="en-US" sz="1200" b="1" i="0" u="none" strike="noStrike" baseline="0" dirty="0" err="1" smtClean="0">
+                          <a:solidFill>
+                            <a:schemeClr val="tx1"/>
+                          </a:solidFill>
+                          <a:effectLst/>
+                          <a:latin typeface="+mn-ea"/>
+                          <a:ea typeface="나눔바른고딕" panose="020B0603020101020101"/>
+                        </a:rPr>
+                        <a:t>등록시</a:t>
+                      </a:r>
+                      <a:r>
+                        <a:rPr lang="ko-KR" altLang="en-US" sz="1200" b="1" i="0" u="none" strike="noStrike" baseline="0" dirty="0" smtClean="0">
+                          <a:solidFill>
+                            <a:schemeClr val="tx1"/>
+                          </a:solidFill>
+                          <a:effectLst/>
+                          <a:latin typeface="+mn-ea"/>
+                          <a:ea typeface="나눔바른고딕" panose="020B0603020101020101"/>
+                        </a:rPr>
+                        <a:t> 주소가 변경</a:t>
+                      </a:r>
+                      <a:endParaRPr lang="ko-KR" altLang="en-US" sz="1200" b="1" i="0" u="none" strike="noStrike" dirty="0">
+                        <a:solidFill>
+                          <a:schemeClr val="tx1"/>
+                        </a:solidFill>
+                        <a:effectLst/>
+                        <a:latin typeface="+mn-ea"/>
+                        <a:ea typeface="나눔바른고딕" panose="020B0603020101020101"/>
+                      </a:endParaRPr>
+                    </a:p>
+                  </a:txBody>
+                  <a:tcPr marL="9525" marR="9525" marT="9525" marB="0">
+                    <a:solidFill>
+                      <a:schemeClr val="bg1"/>
+                    </a:solidFill>
+                  </a:tcPr>
+                </a:tc>
+                <a:tc>
+                  <a:txBody>
+                    <a:bodyPr/>
+                    <a:lstStyle/>
+                    <a:p>
+                      <a:pPr marL="0" indent="0" algn="l" fontAlgn="ctr" latinLnBrk="0">
+                        <a:buFont typeface="Arial" panose="020B0604020202020204" pitchFamily="34" charset="0"/>
+                        <a:buNone/>
+                      </a:pPr>
+                      <a:r>
+                        <a:rPr lang="en-US" altLang="ko-KR" sz="1200" b="1" i="0" u="none" strike="noStrike" dirty="0" smtClean="0">
+                          <a:solidFill>
+                            <a:schemeClr val="tx1"/>
+                          </a:solidFill>
+                          <a:effectLst/>
+                          <a:latin typeface="+mn-ea"/>
+                          <a:ea typeface="나눔바른고딕" panose="020B0603020101020101"/>
+                        </a:rPr>
+                        <a:t>1. </a:t>
+                      </a:r>
+                      <a:r>
+                        <a:rPr lang="ko-KR" altLang="en-US" sz="1200" b="1" i="0" u="none" strike="noStrike" dirty="0" smtClean="0">
+                          <a:solidFill>
+                            <a:schemeClr val="tx1"/>
+                          </a:solidFill>
+                          <a:effectLst/>
+                          <a:latin typeface="+mn-ea"/>
+                          <a:ea typeface="나눔바른고딕" panose="020B0603020101020101"/>
+                        </a:rPr>
+                        <a:t>정상</a:t>
+                      </a:r>
+                    </a:p>
+                    <a:p>
+                      <a:pPr marL="0" indent="0" algn="l" fontAlgn="ctr" latinLnBrk="0">
+                        <a:buFont typeface="Arial" panose="020B0604020202020204" pitchFamily="34" charset="0"/>
+                        <a:buNone/>
+                      </a:pPr>
+                      <a:r>
+                        <a:rPr lang="en-US" altLang="ko-KR" sz="1200" b="1" i="0" u="none" strike="noStrike" dirty="0" smtClean="0">
+                          <a:solidFill>
+                            <a:schemeClr val="tx1"/>
+                          </a:solidFill>
+                          <a:effectLst/>
+                          <a:latin typeface="+mn-ea"/>
+                          <a:ea typeface="나눔바른고딕" panose="020B0603020101020101"/>
+                        </a:rPr>
+                        <a:t>2. </a:t>
+                      </a:r>
+                      <a:r>
+                        <a:rPr lang="ko-KR" altLang="en-US" sz="1200" b="1" i="0" u="none" strike="noStrike" dirty="0" smtClean="0">
+                          <a:solidFill>
+                            <a:schemeClr val="tx1"/>
+                          </a:solidFill>
+                          <a:effectLst/>
+                          <a:latin typeface="+mn-ea"/>
+                          <a:ea typeface="나눔바른고딕" panose="020B0603020101020101"/>
+                        </a:rPr>
+                        <a:t>정상</a:t>
+                      </a:r>
+                      <a:endParaRPr lang="ko-KR" altLang="en-US" sz="1200" b="1" i="0" u="none" strike="noStrike" dirty="0">
+                        <a:solidFill>
+                          <a:schemeClr val="tx1"/>
+                        </a:solidFill>
+                        <a:effectLst/>
+                        <a:latin typeface="+mn-ea"/>
+                        <a:ea typeface="나눔바른고딕" panose="020B0603020101020101"/>
+                      </a:endParaRPr>
+                    </a:p>
+                  </a:txBody>
+                  <a:tcPr marL="9525" marR="9525" marT="9525" marB="0">
+                    <a:solidFill>
+                      <a:schemeClr val="bg1"/>
+                    </a:solidFill>
+                  </a:tcPr>
+                </a:tc>
+                <a:tc>
+                  <a:txBody>
+                    <a:bodyPr/>
+                    <a:lstStyle/>
+                    <a:p>
+                      <a:pPr marL="0" indent="0" algn="l" fontAlgn="ctr" latinLnBrk="0">
+                        <a:buFont typeface="Arial" panose="020B0604020202020204" pitchFamily="34" charset="0"/>
+                        <a:buNone/>
+                      </a:pPr>
+                      <a:r>
+                        <a:rPr lang="en-US" altLang="ko-KR" sz="1200" b="1" i="0" u="none" strike="noStrike" dirty="0" smtClean="0">
+                          <a:solidFill>
+                            <a:schemeClr val="tx1"/>
+                          </a:solidFill>
+                          <a:effectLst/>
+                          <a:latin typeface="+mn-ea"/>
+                          <a:ea typeface="나눔바른고딕" panose="020B0603020101020101"/>
+                        </a:rPr>
+                        <a:t>N/A</a:t>
+                      </a:r>
+                      <a:endParaRPr lang="en-US" altLang="ko-KR" sz="1200" b="1" i="0" u="none" strike="noStrike" dirty="0">
+                        <a:solidFill>
+                          <a:schemeClr val="tx1"/>
+                        </a:solidFill>
+                        <a:effectLst/>
+                        <a:latin typeface="+mn-ea"/>
+                        <a:ea typeface="나눔바른고딕" panose="020B0603020101020101"/>
+                      </a:endParaRPr>
+                    </a:p>
+                  </a:txBody>
+                  <a:tcPr marL="72000" marR="72000" marT="72000" marB="72000">
+                    <a:solidFill>
+                      <a:schemeClr val="bg1"/>
+                    </a:solidFill>
+                  </a:tcPr>
+                </a:tc>
+                <a:extLst>
+                  <a:ext uri="{0D108BD9-81ED-4DB2-BD59-A6C34878D82A}">
+                    <a16:rowId xmlns:a16="http://schemas.microsoft.com/office/drawing/2014/main" xmlns="" val="10001"/>
+                  </a:ext>
+                </a:extLst>
+              </a:tr>
+              <a:tr h="1277863">
+                <a:tc>
+                  <a:txBody>
+                    <a:bodyPr/>
+                    <a:lstStyle/>
+                    <a:p>
+                      <a:pPr algn="ctr" fontAlgn="ctr" latinLnBrk="0"/>
+                      <a:r>
+                        <a:rPr lang="ko-KR" altLang="en-US" sz="1200" b="1" i="0" u="none" strike="noStrike" dirty="0" err="1" smtClean="0">
+                          <a:solidFill>
+                            <a:srgbClr val="000000"/>
+                          </a:solidFill>
+                          <a:effectLst/>
+                          <a:latin typeface="맑은 고딕" panose="020B0503020000020004" pitchFamily="50" charset="-127"/>
+                          <a:ea typeface="나눔바른고딕" panose="020B0603020101020101"/>
+                        </a:rPr>
+                        <a:t>마이페이지</a:t>
+                      </a:r>
+                      <a:r>
+                        <a:rPr lang="ko-KR" altLang="en-US" sz="1200" b="1" i="0" u="none" strike="noStrike" dirty="0" smtClean="0">
+                          <a:solidFill>
+                            <a:srgbClr val="000000"/>
+                          </a:solidFill>
+                          <a:effectLst/>
+                          <a:latin typeface="맑은 고딕" panose="020B0503020000020004" pitchFamily="50" charset="-127"/>
+                          <a:ea typeface="나눔바른고딕" panose="020B0603020101020101"/>
+                        </a:rPr>
+                        <a:t> </a:t>
+                      </a:r>
+                      <a:r>
+                        <a:rPr lang="en-US" altLang="ko-KR" sz="1200" b="1" i="0" u="none" strike="noStrike" dirty="0" smtClean="0">
+                          <a:solidFill>
+                            <a:srgbClr val="000000"/>
+                          </a:solidFill>
+                          <a:effectLst/>
+                          <a:latin typeface="맑은 고딕" panose="020B0503020000020004" pitchFamily="50" charset="-127"/>
+                          <a:ea typeface="나눔바른고딕" panose="020B0603020101020101"/>
+                        </a:rPr>
+                        <a:t>&gt; </a:t>
+                      </a:r>
+                      <a:r>
+                        <a:rPr lang="ko-KR" altLang="en-US" sz="1200" b="1" i="0" u="none" strike="noStrike" dirty="0" smtClean="0">
+                          <a:solidFill>
+                            <a:srgbClr val="000000"/>
+                          </a:solidFill>
+                          <a:effectLst/>
+                          <a:latin typeface="맑은 고딕" panose="020B0503020000020004" pitchFamily="50" charset="-127"/>
+                          <a:ea typeface="나눔바른고딕" panose="020B0603020101020101"/>
+                        </a:rPr>
+                        <a:t>주문 취소</a:t>
+                      </a:r>
+                      <a:endParaRPr lang="ko-KR" altLang="en-US" sz="1200" b="1" i="0" u="none" strike="noStrike" dirty="0">
+                        <a:solidFill>
+                          <a:srgbClr val="000000"/>
+                        </a:solidFill>
+                        <a:effectLst/>
+                        <a:latin typeface="맑은 고딕" panose="020B0503020000020004" pitchFamily="50" charset="-127"/>
+                        <a:ea typeface="나눔바른고딕" panose="020B0603020101020101"/>
+                      </a:endParaRPr>
+                    </a:p>
+                  </a:txBody>
+                  <a:tcPr marL="9525" marR="9525" marT="9525" marB="0" anchor="ctr">
+                    <a:solidFill>
+                      <a:schemeClr val="bg1"/>
+                    </a:solidFill>
+                  </a:tcPr>
+                </a:tc>
+                <a:tc>
+                  <a:txBody>
+                    <a:bodyPr/>
+                    <a:lstStyle/>
+                    <a:p>
+                      <a:pPr marL="0" indent="0" algn="l" fontAlgn="ctr" latinLnBrk="0">
+                        <a:buFont typeface="Arial" panose="020B0604020202020204" pitchFamily="34" charset="0"/>
+                        <a:buNone/>
+                      </a:pPr>
+                      <a:r>
+                        <a:rPr lang="en-US" altLang="ko-KR" sz="1200" b="1" i="0" u="none" strike="noStrike" dirty="0" smtClean="0">
+                          <a:solidFill>
+                            <a:schemeClr val="tx1"/>
+                          </a:solidFill>
+                          <a:effectLst/>
+                          <a:latin typeface="+mn-ea"/>
+                          <a:ea typeface="나눔바른고딕" panose="020B0603020101020101"/>
+                        </a:rPr>
+                        <a:t>1. </a:t>
+                      </a:r>
+                      <a:r>
+                        <a:rPr lang="ko-KR" altLang="en-US" sz="1200" b="1" i="0" u="none" strike="noStrike" dirty="0" smtClean="0">
+                          <a:solidFill>
+                            <a:schemeClr val="tx1"/>
+                          </a:solidFill>
+                          <a:effectLst/>
+                          <a:latin typeface="+mn-ea"/>
+                          <a:ea typeface="나눔바른고딕" panose="020B0603020101020101"/>
+                        </a:rPr>
+                        <a:t>주문 취소 버튼 </a:t>
+                      </a:r>
+                      <a:r>
+                        <a:rPr lang="ko-KR" altLang="en-US" sz="1200" b="1" i="0" u="none" strike="noStrike" dirty="0" err="1" smtClean="0">
+                          <a:solidFill>
+                            <a:schemeClr val="tx1"/>
+                          </a:solidFill>
+                          <a:effectLst/>
+                          <a:latin typeface="+mn-ea"/>
+                          <a:ea typeface="나눔바른고딕" panose="020B0603020101020101"/>
+                        </a:rPr>
+                        <a:t>클릭시</a:t>
+                      </a:r>
+                      <a:r>
+                        <a:rPr lang="ko-KR" altLang="en-US" sz="1200" b="1" i="0" u="none" strike="noStrike" dirty="0" smtClean="0">
+                          <a:solidFill>
+                            <a:schemeClr val="tx1"/>
+                          </a:solidFill>
+                          <a:effectLst/>
+                          <a:latin typeface="+mn-ea"/>
+                          <a:ea typeface="나눔바른고딕" panose="020B0603020101020101"/>
+                        </a:rPr>
+                        <a:t> 주문 취소를 다시 확인 하는 창이 표시</a:t>
+                      </a:r>
+                    </a:p>
+                    <a:p>
+                      <a:pPr marL="0" indent="0" algn="l" fontAlgn="ctr" latinLnBrk="0">
+                        <a:buFont typeface="Arial" panose="020B0604020202020204" pitchFamily="34" charset="0"/>
+                        <a:buNone/>
+                      </a:pPr>
+                      <a:r>
+                        <a:rPr lang="en-US" altLang="ko-KR" sz="1200" b="1" i="0" u="none" strike="noStrike" dirty="0" smtClean="0">
+                          <a:solidFill>
+                            <a:schemeClr val="tx1"/>
+                          </a:solidFill>
+                          <a:effectLst/>
+                          <a:latin typeface="+mn-ea"/>
+                          <a:ea typeface="나눔바른고딕" panose="020B0603020101020101"/>
+                        </a:rPr>
+                        <a:t>2. </a:t>
+                      </a:r>
+                      <a:r>
+                        <a:rPr lang="ko-KR" altLang="en-US" sz="1200" b="1" i="0" u="none" strike="noStrike" dirty="0" err="1" smtClean="0">
+                          <a:solidFill>
+                            <a:schemeClr val="tx1"/>
+                          </a:solidFill>
+                          <a:effectLst/>
+                          <a:latin typeface="+mn-ea"/>
+                          <a:ea typeface="나눔바른고딕" panose="020B0603020101020101"/>
+                        </a:rPr>
+                        <a:t>펀딩</a:t>
+                      </a:r>
+                      <a:r>
+                        <a:rPr lang="ko-KR" altLang="en-US" sz="1200" b="1" i="0" u="none" strike="noStrike" dirty="0" smtClean="0">
+                          <a:solidFill>
+                            <a:schemeClr val="tx1"/>
+                          </a:solidFill>
+                          <a:effectLst/>
+                          <a:latin typeface="+mn-ea"/>
+                          <a:ea typeface="나눔바른고딕" panose="020B0603020101020101"/>
+                        </a:rPr>
+                        <a:t> 취소 </a:t>
+                      </a:r>
+                      <a:r>
+                        <a:rPr lang="ko-KR" altLang="en-US" sz="1200" b="1" i="0" u="none" strike="noStrike" dirty="0" err="1" smtClean="0">
+                          <a:solidFill>
+                            <a:schemeClr val="tx1"/>
+                          </a:solidFill>
+                          <a:effectLst/>
+                          <a:latin typeface="+mn-ea"/>
+                          <a:ea typeface="나눔바른고딕" panose="020B0603020101020101"/>
+                        </a:rPr>
+                        <a:t>완료시</a:t>
+                      </a:r>
+                      <a:r>
+                        <a:rPr lang="ko-KR" altLang="en-US" sz="1200" b="1" i="0" u="none" strike="noStrike" dirty="0" smtClean="0">
+                          <a:solidFill>
+                            <a:schemeClr val="tx1"/>
+                          </a:solidFill>
+                          <a:effectLst/>
+                          <a:latin typeface="+mn-ea"/>
+                          <a:ea typeface="나눔바른고딕" panose="020B0603020101020101"/>
+                        </a:rPr>
+                        <a:t> 우측 상단의 주문 상태가 </a:t>
+                      </a:r>
+                      <a:r>
+                        <a:rPr lang="en-US" altLang="ko-KR" sz="1200" b="1" i="0" u="none" strike="noStrike" dirty="0" smtClean="0">
+                          <a:solidFill>
+                            <a:schemeClr val="tx1"/>
+                          </a:solidFill>
+                          <a:effectLst/>
+                          <a:latin typeface="+mn-ea"/>
+                          <a:ea typeface="나눔바른고딕" panose="020B0603020101020101"/>
+                        </a:rPr>
+                        <a:t>'</a:t>
+                      </a:r>
+                      <a:r>
+                        <a:rPr lang="ko-KR" altLang="en-US" sz="1200" b="1" i="0" u="none" strike="noStrike" dirty="0" smtClean="0">
+                          <a:solidFill>
+                            <a:schemeClr val="tx1"/>
+                          </a:solidFill>
+                          <a:effectLst/>
+                          <a:latin typeface="+mn-ea"/>
+                          <a:ea typeface="나눔바른고딕" panose="020B0603020101020101"/>
+                        </a:rPr>
+                        <a:t>주문 취소</a:t>
+                      </a:r>
+                      <a:r>
+                        <a:rPr lang="en-US" altLang="ko-KR" sz="1200" b="1" i="0" u="none" strike="noStrike" dirty="0" smtClean="0">
+                          <a:solidFill>
+                            <a:schemeClr val="tx1"/>
+                          </a:solidFill>
+                          <a:effectLst/>
+                          <a:latin typeface="+mn-ea"/>
+                          <a:ea typeface="나눔바른고딕" panose="020B0603020101020101"/>
+                        </a:rPr>
+                        <a:t>'</a:t>
+                      </a:r>
+                      <a:r>
+                        <a:rPr lang="ko-KR" altLang="en-US" sz="1200" b="1" i="0" u="none" strike="noStrike" dirty="0" smtClean="0">
+                          <a:solidFill>
+                            <a:schemeClr val="tx1"/>
+                          </a:solidFill>
+                          <a:effectLst/>
+                          <a:latin typeface="+mn-ea"/>
+                          <a:ea typeface="나눔바른고딕" panose="020B0603020101020101"/>
+                        </a:rPr>
+                        <a:t>로 변경</a:t>
+                      </a:r>
+                      <a:endParaRPr lang="ko-KR" altLang="en-US" sz="1200" b="1" i="0" u="none" strike="noStrike" dirty="0">
+                        <a:solidFill>
+                          <a:schemeClr val="tx1"/>
+                        </a:solidFill>
+                        <a:effectLst/>
+                        <a:latin typeface="+mn-ea"/>
+                        <a:ea typeface="나눔바른고딕" panose="020B0603020101020101"/>
+                      </a:endParaRPr>
+                    </a:p>
+                  </a:txBody>
+                  <a:tcPr marL="9525" marR="9525" marT="9525" marB="0">
+                    <a:solidFill>
+                      <a:schemeClr val="bg1"/>
+                    </a:solidFill>
+                  </a:tcPr>
+                </a:tc>
+                <a:tc>
+                  <a:txBody>
+                    <a:bodyPr/>
+                    <a:lstStyle/>
+                    <a:p>
+                      <a:pPr marL="0" indent="0" algn="l" fontAlgn="ctr" latinLnBrk="0">
+                        <a:buFont typeface="Arial" panose="020B0604020202020204" pitchFamily="34" charset="0"/>
+                        <a:buNone/>
+                      </a:pPr>
+                      <a:r>
+                        <a:rPr lang="en-US" altLang="ko-KR" sz="1200" b="1" i="0" u="none" strike="noStrike" dirty="0" smtClean="0">
+                          <a:solidFill>
+                            <a:schemeClr val="tx1"/>
+                          </a:solidFill>
+                          <a:effectLst/>
+                          <a:latin typeface="+mn-ea"/>
+                          <a:ea typeface="나눔바른고딕" panose="020B0603020101020101"/>
+                        </a:rPr>
+                        <a:t>1. </a:t>
+                      </a:r>
+                      <a:r>
+                        <a:rPr lang="ko-KR" altLang="en-US" sz="1200" b="1" i="0" u="none" strike="noStrike" dirty="0" smtClean="0">
+                          <a:solidFill>
+                            <a:schemeClr val="tx1"/>
+                          </a:solidFill>
+                          <a:effectLst/>
+                          <a:latin typeface="+mn-ea"/>
+                          <a:ea typeface="나눔바른고딕" panose="020B0603020101020101"/>
+                        </a:rPr>
+                        <a:t>잘됨</a:t>
+                      </a:r>
+                    </a:p>
+                    <a:p>
+                      <a:pPr marL="0" indent="0" algn="l" fontAlgn="ctr" latinLnBrk="0">
+                        <a:buFont typeface="Arial" panose="020B0604020202020204" pitchFamily="34" charset="0"/>
+                        <a:buNone/>
+                      </a:pPr>
+                      <a:r>
+                        <a:rPr lang="en-US" altLang="ko-KR" sz="1200" b="1" i="0" u="none" strike="noStrike" dirty="0" smtClean="0">
+                          <a:solidFill>
+                            <a:schemeClr val="tx1"/>
+                          </a:solidFill>
+                          <a:effectLst/>
+                          <a:latin typeface="+mn-ea"/>
+                          <a:ea typeface="나눔바른고딕" panose="020B0603020101020101"/>
+                        </a:rPr>
+                        <a:t>2. </a:t>
+                      </a:r>
+                      <a:r>
+                        <a:rPr lang="ko-KR" altLang="en-US" sz="1200" b="1" i="0" u="none" strike="noStrike" dirty="0" err="1" smtClean="0">
+                          <a:solidFill>
+                            <a:schemeClr val="tx1"/>
+                          </a:solidFill>
+                          <a:effectLst/>
+                          <a:latin typeface="+mn-ea"/>
+                          <a:ea typeface="나눔바른고딕" panose="020B0603020101020101"/>
+                        </a:rPr>
+                        <a:t>변경안됨</a:t>
+                      </a:r>
+                      <a:endParaRPr lang="ko-KR" altLang="en-US" sz="1200" b="1" i="0" u="none" strike="noStrike" dirty="0">
+                        <a:solidFill>
+                          <a:schemeClr val="tx1"/>
+                        </a:solidFill>
+                        <a:effectLst/>
+                        <a:latin typeface="+mn-ea"/>
+                        <a:ea typeface="나눔바른고딕" panose="020B0603020101020101"/>
+                      </a:endParaRPr>
+                    </a:p>
+                  </a:txBody>
+                  <a:tcPr marL="9525" marR="9525" marT="9525" marB="0">
+                    <a:solidFill>
+                      <a:schemeClr val="bg1"/>
+                    </a:solidFill>
+                  </a:tcPr>
+                </a:tc>
+                <a:tc>
+                  <a:txBody>
+                    <a:bodyPr/>
+                    <a:lstStyle/>
+                    <a:p>
+                      <a:pPr marL="0" indent="0" algn="l" fontAlgn="ctr" latinLnBrk="0">
+                        <a:buFont typeface="Arial" panose="020B0604020202020204" pitchFamily="34" charset="0"/>
+                        <a:buNone/>
+                      </a:pPr>
+                      <a:r>
+                        <a:rPr lang="en-US" altLang="ko-KR" sz="1200" b="1" i="0" u="none" strike="noStrike" dirty="0" smtClean="0">
+                          <a:solidFill>
+                            <a:schemeClr val="tx1"/>
+                          </a:solidFill>
+                          <a:effectLst/>
+                          <a:latin typeface="+mn-ea"/>
+                          <a:ea typeface="나눔바른고딕" panose="020B0603020101020101"/>
+                        </a:rPr>
+                        <a:t>2.</a:t>
+                      </a:r>
+                      <a:r>
+                        <a:rPr lang="en-US" altLang="ko-KR" sz="1200" b="1" i="0" u="none" strike="noStrike" baseline="0" dirty="0" smtClean="0">
+                          <a:solidFill>
+                            <a:schemeClr val="tx1"/>
+                          </a:solidFill>
+                          <a:effectLst/>
+                          <a:latin typeface="+mn-ea"/>
+                          <a:ea typeface="나눔바른고딕" panose="020B0603020101020101"/>
+                        </a:rPr>
+                        <a:t> </a:t>
+                      </a:r>
+                      <a:r>
+                        <a:rPr lang="ko-KR" altLang="en-US" sz="1200" b="1" i="0" u="none" strike="noStrike" baseline="0" dirty="0" smtClean="0">
+                          <a:solidFill>
+                            <a:schemeClr val="tx1"/>
+                          </a:solidFill>
+                          <a:effectLst/>
+                          <a:latin typeface="+mn-ea"/>
+                          <a:ea typeface="나눔바른고딕" panose="020B0603020101020101"/>
+                        </a:rPr>
+                        <a:t>수정 완료</a:t>
+                      </a:r>
+                      <a:r>
+                        <a:rPr lang="en-US" altLang="ko-KR" sz="1200" b="1" i="0" u="none" strike="noStrike" baseline="0" dirty="0" smtClean="0">
+                          <a:solidFill>
+                            <a:schemeClr val="tx1"/>
+                          </a:solidFill>
+                          <a:effectLst/>
+                          <a:latin typeface="+mn-ea"/>
+                          <a:ea typeface="나눔바른고딕" panose="020B0603020101020101"/>
+                        </a:rPr>
+                        <a:t>(2020/06/03)</a:t>
+                      </a:r>
+                      <a:endParaRPr lang="en-US" altLang="ko-KR" sz="1200" b="1" i="0" u="none" strike="noStrike" baseline="0" dirty="0" smtClean="0">
+                        <a:solidFill>
+                          <a:schemeClr val="tx1"/>
+                        </a:solidFill>
+                        <a:effectLst/>
+                        <a:latin typeface="+mn-ea"/>
+                        <a:ea typeface="나눔바른고딕" panose="020B0603020101020101"/>
+                      </a:endParaRPr>
+                    </a:p>
+                  </a:txBody>
+                  <a:tcPr marL="9525" marR="9525" marT="9525" marB="0">
+                    <a:solidFill>
+                      <a:schemeClr val="bg1"/>
+                    </a:solidFill>
+                  </a:tcPr>
+                </a:tc>
+                <a:extLst>
+                  <a:ext uri="{0D108BD9-81ED-4DB2-BD59-A6C34878D82A}">
+                    <a16:rowId xmlns:a16="http://schemas.microsoft.com/office/drawing/2014/main" xmlns="" val="1377291653"/>
+                  </a:ext>
+                </a:extLst>
+              </a:tr>
+              <a:tr h="1541341">
+                <a:tc>
+                  <a:txBody>
+                    <a:bodyPr/>
+                    <a:lstStyle/>
+                    <a:p>
+                      <a:pPr algn="ctr" fontAlgn="ctr" latinLnBrk="0"/>
+                      <a:r>
+                        <a:rPr lang="ko-KR" altLang="en-US" sz="1200" b="1" i="0" u="none" strike="noStrike" dirty="0" err="1" smtClean="0">
+                          <a:solidFill>
+                            <a:srgbClr val="000000"/>
+                          </a:solidFill>
+                          <a:effectLst/>
+                          <a:latin typeface="맑은 고딕" panose="020B0503020000020004" pitchFamily="50" charset="-127"/>
+                          <a:ea typeface="나눔바른고딕" panose="020B0603020101020101"/>
+                        </a:rPr>
+                        <a:t>마이페이지</a:t>
+                      </a:r>
+                      <a:r>
+                        <a:rPr lang="ko-KR" altLang="en-US" sz="1200" b="1" i="0" u="none" strike="noStrike" dirty="0" smtClean="0">
+                          <a:solidFill>
+                            <a:srgbClr val="000000"/>
+                          </a:solidFill>
+                          <a:effectLst/>
+                          <a:latin typeface="맑은 고딕" panose="020B0503020000020004" pitchFamily="50" charset="-127"/>
+                          <a:ea typeface="나눔바른고딕" panose="020B0603020101020101"/>
+                        </a:rPr>
+                        <a:t> </a:t>
+                      </a:r>
+                      <a:r>
+                        <a:rPr lang="en-US" altLang="ko-KR" sz="1200" b="1" i="0" u="none" strike="noStrike" dirty="0" smtClean="0">
+                          <a:solidFill>
+                            <a:srgbClr val="000000"/>
+                          </a:solidFill>
+                          <a:effectLst/>
+                          <a:latin typeface="맑은 고딕" panose="020B0503020000020004" pitchFamily="50" charset="-127"/>
+                          <a:ea typeface="나눔바른고딕" panose="020B0603020101020101"/>
+                        </a:rPr>
+                        <a:t>&gt; </a:t>
+                      </a:r>
+                      <a:r>
+                        <a:rPr lang="ko-KR" altLang="en-US" sz="1200" b="1" i="0" u="none" strike="noStrike" dirty="0" smtClean="0">
+                          <a:solidFill>
+                            <a:srgbClr val="000000"/>
+                          </a:solidFill>
+                          <a:effectLst/>
+                          <a:latin typeface="맑은 고딕" panose="020B0503020000020004" pitchFamily="50" charset="-127"/>
+                          <a:ea typeface="나눔바른고딕" panose="020B0603020101020101"/>
+                        </a:rPr>
+                        <a:t>프로필 편집 </a:t>
+                      </a:r>
+                      <a:r>
+                        <a:rPr lang="en-US" altLang="ko-KR" sz="1200" b="1" i="0" u="none" strike="noStrike" dirty="0" smtClean="0">
+                          <a:solidFill>
+                            <a:srgbClr val="000000"/>
+                          </a:solidFill>
+                          <a:effectLst/>
+                          <a:latin typeface="맑은 고딕" panose="020B0503020000020004" pitchFamily="50" charset="-127"/>
+                          <a:ea typeface="나눔바른고딕" panose="020B0603020101020101"/>
+                        </a:rPr>
+                        <a:t>&gt; </a:t>
+                      </a:r>
+                      <a:r>
+                        <a:rPr lang="ko-KR" altLang="en-US" sz="1200" b="1" i="0" u="none" strike="noStrike" dirty="0" smtClean="0">
+                          <a:solidFill>
+                            <a:srgbClr val="000000"/>
+                          </a:solidFill>
+                          <a:effectLst/>
+                          <a:latin typeface="맑은 고딕" panose="020B0503020000020004" pitchFamily="50" charset="-127"/>
+                          <a:ea typeface="나눔바른고딕" panose="020B0603020101020101"/>
+                        </a:rPr>
+                        <a:t>프로필 이미지 바꾸기</a:t>
+                      </a:r>
+                      <a:endParaRPr lang="ko-KR" altLang="en-US" sz="1200" b="1" i="0" u="none" strike="noStrike" dirty="0">
+                        <a:solidFill>
+                          <a:srgbClr val="000000"/>
+                        </a:solidFill>
+                        <a:effectLst/>
+                        <a:latin typeface="맑은 고딕" panose="020B0503020000020004" pitchFamily="50" charset="-127"/>
+                        <a:ea typeface="나눔바른고딕" panose="020B0603020101020101"/>
+                      </a:endParaRPr>
+                    </a:p>
+                  </a:txBody>
+                  <a:tcPr marL="9525" marR="9525" marT="9525" marB="0" anchor="ctr">
+                    <a:solidFill>
+                      <a:schemeClr val="bg1"/>
+                    </a:solidFill>
+                  </a:tcPr>
+                </a:tc>
+                <a:tc>
+                  <a:txBody>
+                    <a:bodyPr/>
+                    <a:lstStyle/>
+                    <a:p>
+                      <a:pPr marL="0" indent="0" algn="l" fontAlgn="ctr" latinLnBrk="0">
+                        <a:buFont typeface="Arial" panose="020B0604020202020204" pitchFamily="34" charset="0"/>
+                        <a:buNone/>
+                      </a:pPr>
+                      <a:r>
+                        <a:rPr lang="en-US" altLang="ko-KR" sz="1200" b="1" i="0" u="none" strike="noStrike" dirty="0" smtClean="0">
+                          <a:solidFill>
+                            <a:schemeClr val="tx1"/>
+                          </a:solidFill>
+                          <a:effectLst/>
+                          <a:latin typeface="+mn-ea"/>
+                          <a:ea typeface="나눔바른고딕" panose="020B0603020101020101"/>
+                        </a:rPr>
+                        <a:t>1. </a:t>
+                      </a:r>
+                      <a:r>
+                        <a:rPr lang="ko-KR" altLang="en-US" sz="1200" b="1" i="0" u="none" strike="noStrike" dirty="0" smtClean="0">
+                          <a:solidFill>
+                            <a:schemeClr val="tx1"/>
+                          </a:solidFill>
+                          <a:effectLst/>
+                          <a:latin typeface="+mn-ea"/>
+                          <a:ea typeface="나눔바른고딕" panose="020B0603020101020101"/>
+                        </a:rPr>
+                        <a:t>이미지 파일 업로드 후 이미지 </a:t>
+                      </a:r>
+                      <a:r>
+                        <a:rPr lang="ko-KR" altLang="en-US" sz="1200" b="1" i="0" u="none" strike="noStrike" dirty="0" err="1" smtClean="0">
+                          <a:solidFill>
+                            <a:schemeClr val="tx1"/>
+                          </a:solidFill>
+                          <a:effectLst/>
+                          <a:latin typeface="+mn-ea"/>
+                          <a:ea typeface="나눔바른고딕" panose="020B0603020101020101"/>
+                        </a:rPr>
+                        <a:t>미리보기</a:t>
+                      </a:r>
+                      <a:endParaRPr lang="ko-KR" altLang="en-US" sz="1200" b="1" i="0" u="none" strike="noStrike" dirty="0" smtClean="0">
+                        <a:solidFill>
+                          <a:schemeClr val="tx1"/>
+                        </a:solidFill>
+                        <a:effectLst/>
+                        <a:latin typeface="+mn-ea"/>
+                        <a:ea typeface="나눔바른고딕" panose="020B0603020101020101"/>
+                      </a:endParaRPr>
+                    </a:p>
+                    <a:p>
+                      <a:pPr marL="0" indent="0" algn="l" fontAlgn="ctr" latinLnBrk="0">
+                        <a:buFont typeface="Arial" panose="020B0604020202020204" pitchFamily="34" charset="0"/>
+                        <a:buNone/>
+                      </a:pPr>
+                      <a:r>
+                        <a:rPr lang="en-US" altLang="ko-KR" sz="1200" b="1" i="0" u="none" strike="noStrike" dirty="0" smtClean="0">
+                          <a:solidFill>
+                            <a:schemeClr val="tx1"/>
+                          </a:solidFill>
+                          <a:effectLst/>
+                          <a:latin typeface="+mn-ea"/>
+                          <a:ea typeface="나눔바른고딕" panose="020B0603020101020101"/>
+                        </a:rPr>
+                        <a:t>2. </a:t>
+                      </a:r>
+                      <a:r>
+                        <a:rPr lang="ko-KR" altLang="en-US" sz="1200" b="1" i="0" u="none" strike="noStrike" dirty="0" err="1" smtClean="0">
+                          <a:solidFill>
+                            <a:schemeClr val="tx1"/>
+                          </a:solidFill>
+                          <a:effectLst/>
+                          <a:latin typeface="+mn-ea"/>
+                          <a:ea typeface="나눔바른고딕" panose="020B0603020101020101"/>
+                        </a:rPr>
+                        <a:t>미리보기</a:t>
+                      </a:r>
+                      <a:r>
+                        <a:rPr lang="ko-KR" altLang="en-US" sz="1200" b="1" i="0" u="none" strike="noStrike" dirty="0" smtClean="0">
+                          <a:solidFill>
+                            <a:schemeClr val="tx1"/>
+                          </a:solidFill>
+                          <a:effectLst/>
+                          <a:latin typeface="+mn-ea"/>
+                          <a:ea typeface="나눔바른고딕" panose="020B0603020101020101"/>
+                        </a:rPr>
+                        <a:t> 상태에서 수정버튼 </a:t>
+                      </a:r>
+                      <a:r>
+                        <a:rPr lang="ko-KR" altLang="en-US" sz="1200" b="1" i="0" u="none" strike="noStrike" dirty="0" err="1" smtClean="0">
+                          <a:solidFill>
+                            <a:schemeClr val="tx1"/>
+                          </a:solidFill>
+                          <a:effectLst/>
+                          <a:latin typeface="+mn-ea"/>
+                          <a:ea typeface="나눔바른고딕" panose="020B0603020101020101"/>
+                        </a:rPr>
+                        <a:t>미클릭시</a:t>
+                      </a:r>
+                      <a:r>
+                        <a:rPr lang="ko-KR" altLang="en-US" sz="1200" b="1" i="0" u="none" strike="noStrike" dirty="0" smtClean="0">
+                          <a:solidFill>
+                            <a:schemeClr val="tx1"/>
+                          </a:solidFill>
+                          <a:effectLst/>
+                          <a:latin typeface="+mn-ea"/>
+                          <a:ea typeface="나눔바른고딕" panose="020B0603020101020101"/>
+                        </a:rPr>
+                        <a:t> 변경되지 않음</a:t>
+                      </a:r>
+                      <a:endParaRPr lang="ko-KR" altLang="en-US" sz="1200" b="1" i="0" u="none" strike="noStrike" dirty="0">
+                        <a:solidFill>
+                          <a:schemeClr val="tx1"/>
+                        </a:solidFill>
+                        <a:effectLst/>
+                        <a:latin typeface="+mn-ea"/>
+                        <a:ea typeface="나눔바른고딕" panose="020B0603020101020101"/>
+                      </a:endParaRPr>
+                    </a:p>
+                  </a:txBody>
+                  <a:tcPr marL="9525" marR="9525" marT="9525" marB="0">
+                    <a:solidFill>
+                      <a:schemeClr val="bg1"/>
+                    </a:solidFill>
+                  </a:tcPr>
+                </a:tc>
+                <a:tc>
+                  <a:txBody>
+                    <a:bodyPr/>
+                    <a:lstStyle/>
+                    <a:p>
+                      <a:pPr marL="0" indent="0" algn="l" fontAlgn="ctr" latinLnBrk="0">
+                        <a:buFont typeface="Arial" panose="020B0604020202020204" pitchFamily="34" charset="0"/>
+                        <a:buNone/>
+                      </a:pPr>
+                      <a:r>
+                        <a:rPr lang="en-US" altLang="ko-KR" sz="1200" b="1" i="0" u="none" strike="noStrike" dirty="0" smtClean="0">
+                          <a:solidFill>
+                            <a:schemeClr val="tx1"/>
+                          </a:solidFill>
+                          <a:effectLst/>
+                          <a:latin typeface="+mn-ea"/>
+                          <a:ea typeface="나눔바른고딕" panose="020B0603020101020101"/>
+                        </a:rPr>
+                        <a:t>1. </a:t>
+                      </a:r>
+                      <a:r>
+                        <a:rPr lang="ko-KR" altLang="en-US" sz="1200" b="1" i="0" u="none" strike="noStrike" dirty="0" err="1" smtClean="0">
+                          <a:solidFill>
+                            <a:schemeClr val="tx1"/>
+                          </a:solidFill>
+                          <a:effectLst/>
+                          <a:latin typeface="+mn-ea"/>
+                          <a:ea typeface="나눔바른고딕" panose="020B0603020101020101"/>
+                        </a:rPr>
+                        <a:t>사진미리보기</a:t>
+                      </a:r>
+                      <a:r>
+                        <a:rPr lang="ko-KR" altLang="en-US" sz="1200" b="1" i="0" u="none" strike="noStrike" dirty="0" smtClean="0">
+                          <a:solidFill>
+                            <a:schemeClr val="tx1"/>
+                          </a:solidFill>
+                          <a:effectLst/>
+                          <a:latin typeface="+mn-ea"/>
+                          <a:ea typeface="나눔바른고딕" panose="020B0603020101020101"/>
+                        </a:rPr>
+                        <a:t> 및 업로드가 </a:t>
+                      </a:r>
+                      <a:r>
+                        <a:rPr lang="ko-KR" altLang="en-US" sz="1200" b="1" i="0" u="none" strike="noStrike" dirty="0" err="1" smtClean="0">
+                          <a:solidFill>
+                            <a:schemeClr val="tx1"/>
+                          </a:solidFill>
+                          <a:effectLst/>
+                          <a:latin typeface="+mn-ea"/>
+                          <a:ea typeface="나눔바른고딕" panose="020B0603020101020101"/>
+                        </a:rPr>
+                        <a:t>작동안함</a:t>
+                      </a:r>
+                      <a:endParaRPr lang="ko-KR" altLang="en-US" sz="1200" b="1" i="0" u="none" strike="noStrike" dirty="0" smtClean="0">
+                        <a:solidFill>
+                          <a:schemeClr val="tx1"/>
+                        </a:solidFill>
+                        <a:effectLst/>
+                        <a:latin typeface="+mn-ea"/>
+                        <a:ea typeface="나눔바른고딕" panose="020B0603020101020101"/>
+                      </a:endParaRPr>
+                    </a:p>
+                    <a:p>
+                      <a:pPr marL="0" indent="0" algn="l" fontAlgn="ctr" latinLnBrk="0">
+                        <a:buFont typeface="Arial" panose="020B0604020202020204" pitchFamily="34" charset="0"/>
+                        <a:buNone/>
+                      </a:pPr>
+                      <a:r>
+                        <a:rPr lang="en-US" altLang="ko-KR" sz="1200" b="1" i="0" u="none" strike="noStrike" dirty="0" smtClean="0">
+                          <a:solidFill>
+                            <a:schemeClr val="tx1"/>
+                          </a:solidFill>
+                          <a:effectLst/>
+                          <a:latin typeface="+mn-ea"/>
+                          <a:ea typeface="나눔바른고딕" panose="020B0603020101020101"/>
+                        </a:rPr>
+                        <a:t>2. </a:t>
+                      </a:r>
+                      <a:r>
+                        <a:rPr lang="ko-KR" altLang="en-US" sz="1200" b="1" i="0" u="none" strike="noStrike" dirty="0" smtClean="0">
+                          <a:solidFill>
+                            <a:schemeClr val="tx1"/>
+                          </a:solidFill>
+                          <a:effectLst/>
+                          <a:latin typeface="+mn-ea"/>
+                          <a:ea typeface="나눔바른고딕" panose="020B0603020101020101"/>
+                        </a:rPr>
+                        <a:t>수정버튼 반응 없음</a:t>
+                      </a:r>
+                      <a:endParaRPr lang="en-US" altLang="ko-KR" sz="1200" b="1" i="0" u="none" strike="noStrike" dirty="0">
+                        <a:solidFill>
+                          <a:schemeClr val="tx1"/>
+                        </a:solidFill>
+                        <a:effectLst/>
+                        <a:latin typeface="+mn-ea"/>
+                        <a:ea typeface="나눔바른고딕" panose="020B0603020101020101"/>
+                      </a:endParaRPr>
+                    </a:p>
+                  </a:txBody>
+                  <a:tcPr marL="9525" marR="9525" marT="9525" marB="0">
+                    <a:solidFill>
+                      <a:schemeClr val="bg1"/>
+                    </a:solidFill>
+                  </a:tcPr>
+                </a:tc>
+                <a:tc>
+                  <a:txBody>
+                    <a:bodyPr/>
+                    <a:lstStyle/>
+                    <a:p>
+                      <a:pPr marL="228600" indent="-228600" algn="l" fontAlgn="ctr" latinLnBrk="0">
+                        <a:buFont typeface="Arial" panose="020B0604020202020204" pitchFamily="34" charset="0"/>
+                        <a:buAutoNum type="arabicPeriod"/>
+                      </a:pPr>
+                      <a:r>
+                        <a:rPr lang="ko-KR" altLang="en-US" sz="1200" b="1" i="0" u="none" strike="noStrike" baseline="0" dirty="0" smtClean="0">
+                          <a:solidFill>
+                            <a:schemeClr val="tx1"/>
+                          </a:solidFill>
+                          <a:effectLst/>
+                          <a:latin typeface="+mn-ea"/>
+                          <a:ea typeface="나눔바른고딕" panose="020B0603020101020101"/>
+                        </a:rPr>
+                        <a:t>수정 완료</a:t>
+                      </a:r>
+                      <a:r>
+                        <a:rPr lang="en-US" altLang="ko-KR" sz="1200" b="1" i="0" u="none" strike="noStrike" baseline="0" dirty="0" smtClean="0">
+                          <a:solidFill>
+                            <a:schemeClr val="tx1"/>
+                          </a:solidFill>
+                          <a:effectLst/>
+                          <a:latin typeface="+mn-ea"/>
+                          <a:ea typeface="나눔바른고딕" panose="020B0603020101020101"/>
+                        </a:rPr>
+                        <a:t>(2020/06/03)</a:t>
+                      </a:r>
+                    </a:p>
+                    <a:p>
+                      <a:pPr marL="228600" indent="-228600" algn="l" fontAlgn="ctr" latinLnBrk="0">
+                        <a:buFont typeface="Arial" panose="020B0604020202020204" pitchFamily="34" charset="0"/>
+                        <a:buAutoNum type="arabicPeriod"/>
+                      </a:pPr>
+                      <a:r>
+                        <a:rPr lang="ko-KR" altLang="en-US" sz="1200" b="1" i="0" u="none" strike="noStrike" dirty="0" smtClean="0">
+                          <a:solidFill>
+                            <a:schemeClr val="tx1"/>
+                          </a:solidFill>
+                          <a:effectLst/>
+                          <a:latin typeface="+mn-ea"/>
+                          <a:ea typeface="나눔바른고딕" panose="020B0603020101020101"/>
+                        </a:rPr>
+                        <a:t>수정 완료</a:t>
+                      </a:r>
+                      <a:r>
+                        <a:rPr lang="en-US" altLang="ko-KR" sz="1200" b="1" i="0" u="none" strike="noStrike" dirty="0" smtClean="0">
+                          <a:solidFill>
+                            <a:schemeClr val="tx1"/>
+                          </a:solidFill>
+                          <a:effectLst/>
+                          <a:latin typeface="+mn-ea"/>
+                          <a:ea typeface="나눔바른고딕" panose="020B0603020101020101"/>
+                        </a:rPr>
+                        <a:t>(2020/06/03)</a:t>
+                      </a:r>
+                      <a:endParaRPr lang="ko-KR" altLang="en-US" sz="1200" b="1" i="0" u="none" strike="noStrike" dirty="0">
+                        <a:solidFill>
+                          <a:schemeClr val="tx1"/>
+                        </a:solidFill>
+                        <a:effectLst/>
+                        <a:latin typeface="+mn-ea"/>
+                        <a:ea typeface="나눔바른고딕" panose="020B0603020101020101"/>
+                      </a:endParaRPr>
+                    </a:p>
+                  </a:txBody>
+                  <a:tcPr marL="9525" marR="9525" marT="9525" marB="0">
+                    <a:solidFill>
+                      <a:schemeClr val="bg1"/>
+                    </a:solidFill>
+                  </a:tcPr>
+                </a:tc>
+                <a:extLst>
+                  <a:ext uri="{0D108BD9-81ED-4DB2-BD59-A6C34878D82A}">
+                    <a16:rowId xmlns:a16="http://schemas.microsoft.com/office/drawing/2014/main" xmlns="" val="1659143481"/>
+                  </a:ext>
+                </a:extLst>
+              </a:tr>
+            </a:tbl>
+          </a:graphicData>
+        </a:graphic>
+      </p:graphicFrame>
+    </p:spTree>
+    <p:extLst>
+      <p:ext uri="{BB962C8B-B14F-4D97-AF65-F5344CB8AC3E}">
+        <p14:creationId xmlns:p14="http://schemas.microsoft.com/office/powerpoint/2010/main" val="1683484399"/>
+      </p:ext>
+    </p:extLst>
+  </p:cSld>
+  <p:clrMapOvr>
+    <a:masterClrMapping/>
+  </p:clrMapOvr>
+  <p:timing>
+    <p:tnLst>
+      <p:par>
+        <p:cTn id="1" dur="indefinite" restart="never" nodeType="tmRoot"/>
+      </p:par>
+    </p:tnLst>
+  </p:timing>
 </p:sld>
 </file>
 
@@ -43115,7 +45771,7 @@
                 <a:gridCol w="2688299">
                   <a:extLst>
                     <a:ext uri="{9D8B030D-6E8A-4147-A177-3AD203B41FA5}">
-                      <a16:colId xmlns="" xmlns:a16="http://schemas.microsoft.com/office/drawing/2014/main" val="20000"/>
+                      <a16:colId xmlns:a16="http://schemas.microsoft.com/office/drawing/2014/main" xmlns="" val="20000"/>
                     </a:ext>
                   </a:extLst>
                 </a:gridCol>
@@ -43147,7 +45803,7 @@
                 </a:tc>
                 <a:extLst>
                   <a:ext uri="{0D108BD9-81ED-4DB2-BD59-A6C34878D82A}">
-                    <a16:rowId xmlns="" xmlns:a16="http://schemas.microsoft.com/office/drawing/2014/main" val="10000"/>
+                    <a16:rowId xmlns:a16="http://schemas.microsoft.com/office/drawing/2014/main" xmlns="" val="10000"/>
                   </a:ext>
                 </a:extLst>
               </a:tr>
@@ -43175,7 +45831,7 @@
                 </a:tc>
                 <a:extLst>
                   <a:ext uri="{0D108BD9-81ED-4DB2-BD59-A6C34878D82A}">
-                    <a16:rowId xmlns="" xmlns:a16="http://schemas.microsoft.com/office/drawing/2014/main" val="10001"/>
+                    <a16:rowId xmlns:a16="http://schemas.microsoft.com/office/drawing/2014/main" xmlns="" val="10001"/>
                   </a:ext>
                 </a:extLst>
               </a:tr>
@@ -43209,14 +45865,14 @@
                 <a:gridCol w="280507">
                   <a:extLst>
                     <a:ext uri="{9D8B030D-6E8A-4147-A177-3AD203B41FA5}">
-                      <a16:colId xmlns="" xmlns:a16="http://schemas.microsoft.com/office/drawing/2014/main" val="20000"/>
+                      <a16:colId xmlns:a16="http://schemas.microsoft.com/office/drawing/2014/main" xmlns="" val="20000"/>
                     </a:ext>
                   </a:extLst>
                 </a:gridCol>
                 <a:gridCol w="2407792">
                   <a:extLst>
                     <a:ext uri="{9D8B030D-6E8A-4147-A177-3AD203B41FA5}">
-                      <a16:colId xmlns="" xmlns:a16="http://schemas.microsoft.com/office/drawing/2014/main" val="20001"/>
+                      <a16:colId xmlns:a16="http://schemas.microsoft.com/office/drawing/2014/main" xmlns="" val="20001"/>
                     </a:ext>
                   </a:extLst>
                 </a:gridCol>
@@ -43278,7 +45934,7 @@
                 </a:tc>
                 <a:extLst>
                   <a:ext uri="{0D108BD9-81ED-4DB2-BD59-A6C34878D82A}">
-                    <a16:rowId xmlns="" xmlns:a16="http://schemas.microsoft.com/office/drawing/2014/main" val="10000"/>
+                    <a16:rowId xmlns:a16="http://schemas.microsoft.com/office/drawing/2014/main" xmlns="" val="10000"/>
                   </a:ext>
                 </a:extLst>
               </a:tr>
@@ -43370,7 +46026,7 @@
                 </a:tc>
                 <a:extLst>
                   <a:ext uri="{0D108BD9-81ED-4DB2-BD59-A6C34878D82A}">
-                    <a16:rowId xmlns="" xmlns:a16="http://schemas.microsoft.com/office/drawing/2014/main" val="10001"/>
+                    <a16:rowId xmlns:a16="http://schemas.microsoft.com/office/drawing/2014/main" xmlns="" val="10001"/>
                   </a:ext>
                 </a:extLst>
               </a:tr>
@@ -43480,7 +46136,7 @@
                 </a:tc>
                 <a:extLst>
                   <a:ext uri="{0D108BD9-81ED-4DB2-BD59-A6C34878D82A}">
-                    <a16:rowId xmlns="" xmlns:a16="http://schemas.microsoft.com/office/drawing/2014/main" val="10002"/>
+                    <a16:rowId xmlns:a16="http://schemas.microsoft.com/office/drawing/2014/main" xmlns="" val="10002"/>
                   </a:ext>
                 </a:extLst>
               </a:tr>
@@ -43605,7 +46261,7 @@
                 </a:tc>
                 <a:extLst>
                   <a:ext uri="{0D108BD9-81ED-4DB2-BD59-A6C34878D82A}">
-                    <a16:rowId xmlns="" xmlns:a16="http://schemas.microsoft.com/office/drawing/2014/main" val="10003"/>
+                    <a16:rowId xmlns:a16="http://schemas.microsoft.com/office/drawing/2014/main" xmlns="" val="10003"/>
                   </a:ext>
                 </a:extLst>
               </a:tr>
@@ -43775,7 +46431,7 @@
                 </a:tc>
                 <a:extLst>
                   <a:ext uri="{0D108BD9-81ED-4DB2-BD59-A6C34878D82A}">
-                    <a16:rowId xmlns="" xmlns:a16="http://schemas.microsoft.com/office/drawing/2014/main" val="10004"/>
+                    <a16:rowId xmlns:a16="http://schemas.microsoft.com/office/drawing/2014/main" xmlns="" val="10004"/>
                   </a:ext>
                 </a:extLst>
               </a:tr>
@@ -47649,7 +50305,7 @@
                 <a:gridCol w="2692879">
                   <a:extLst>
                     <a:ext uri="{9D8B030D-6E8A-4147-A177-3AD203B41FA5}">
-                      <a16:colId xmlns="" xmlns:a16="http://schemas.microsoft.com/office/drawing/2014/main" val="20000"/>
+                      <a16:colId xmlns:a16="http://schemas.microsoft.com/office/drawing/2014/main" xmlns="" val="20000"/>
                     </a:ext>
                   </a:extLst>
                 </a:gridCol>
@@ -47681,7 +50337,7 @@
                 </a:tc>
                 <a:extLst>
                   <a:ext uri="{0D108BD9-81ED-4DB2-BD59-A6C34878D82A}">
-                    <a16:rowId xmlns="" xmlns:a16="http://schemas.microsoft.com/office/drawing/2014/main" val="10000"/>
+                    <a16:rowId xmlns:a16="http://schemas.microsoft.com/office/drawing/2014/main" xmlns="" val="10000"/>
                   </a:ext>
                 </a:extLst>
               </a:tr>
@@ -47709,7 +50365,7 @@
                 </a:tc>
                 <a:extLst>
                   <a:ext uri="{0D108BD9-81ED-4DB2-BD59-A6C34878D82A}">
-                    <a16:rowId xmlns="" xmlns:a16="http://schemas.microsoft.com/office/drawing/2014/main" val="10001"/>
+                    <a16:rowId xmlns:a16="http://schemas.microsoft.com/office/drawing/2014/main" xmlns="" val="10001"/>
                   </a:ext>
                 </a:extLst>
               </a:tr>
@@ -49726,14 +52382,14 @@
                 <a:gridCol w="280507">
                   <a:extLst>
                     <a:ext uri="{9D8B030D-6E8A-4147-A177-3AD203B41FA5}">
-                      <a16:colId xmlns="" xmlns:a16="http://schemas.microsoft.com/office/drawing/2014/main" val="20000"/>
+                      <a16:colId xmlns:a16="http://schemas.microsoft.com/office/drawing/2014/main" xmlns="" val="20000"/>
                     </a:ext>
                   </a:extLst>
                 </a:gridCol>
                 <a:gridCol w="2407792">
                   <a:extLst>
                     <a:ext uri="{9D8B030D-6E8A-4147-A177-3AD203B41FA5}">
-                      <a16:colId xmlns="" xmlns:a16="http://schemas.microsoft.com/office/drawing/2014/main" val="20001"/>
+                      <a16:colId xmlns:a16="http://schemas.microsoft.com/office/drawing/2014/main" xmlns="" val="20001"/>
                     </a:ext>
                   </a:extLst>
                 </a:gridCol>
@@ -49795,7 +52451,7 @@
                 </a:tc>
                 <a:extLst>
                   <a:ext uri="{0D108BD9-81ED-4DB2-BD59-A6C34878D82A}">
-                    <a16:rowId xmlns="" xmlns:a16="http://schemas.microsoft.com/office/drawing/2014/main" val="10000"/>
+                    <a16:rowId xmlns:a16="http://schemas.microsoft.com/office/drawing/2014/main" xmlns="" val="10000"/>
                   </a:ext>
                 </a:extLst>
               </a:tr>
@@ -49905,7 +52561,7 @@
                 </a:tc>
                 <a:extLst>
                   <a:ext uri="{0D108BD9-81ED-4DB2-BD59-A6C34878D82A}">
-                    <a16:rowId xmlns="" xmlns:a16="http://schemas.microsoft.com/office/drawing/2014/main" val="10001"/>
+                    <a16:rowId xmlns:a16="http://schemas.microsoft.com/office/drawing/2014/main" xmlns="" val="10001"/>
                   </a:ext>
                 </a:extLst>
               </a:tr>
@@ -50107,7 +52763,7 @@
                 </a:tc>
                 <a:extLst>
                   <a:ext uri="{0D108BD9-81ED-4DB2-BD59-A6C34878D82A}">
-                    <a16:rowId xmlns="" xmlns:a16="http://schemas.microsoft.com/office/drawing/2014/main" val="10002"/>
+                    <a16:rowId xmlns:a16="http://schemas.microsoft.com/office/drawing/2014/main" xmlns="" val="10002"/>
                   </a:ext>
                 </a:extLst>
               </a:tr>
@@ -50205,7 +52861,7 @@
                 </a:tc>
                 <a:extLst>
                   <a:ext uri="{0D108BD9-81ED-4DB2-BD59-A6C34878D82A}">
-                    <a16:rowId xmlns="" xmlns:a16="http://schemas.microsoft.com/office/drawing/2014/main" val="10003"/>
+                    <a16:rowId xmlns:a16="http://schemas.microsoft.com/office/drawing/2014/main" xmlns="" val="10003"/>
                   </a:ext>
                 </a:extLst>
               </a:tr>
@@ -50833,7 +53489,7 @@
   <a:extraClrSchemeLst/>
   <a:extLst>
     <a:ext uri="{05A4C25C-085E-4340-85A3-A5531E510DB2}">
-      <thm15:themeFamily xmlns="" xmlns:thm15="http://schemas.microsoft.com/office/thememl/2012/main" name="Office Theme" id="{62F939B6-93AF-4DB8-9C6B-D6C7DFDC589F}" vid="{4A3C46E8-61CC-4603-A589-7422A47A8E4A}"/>
+      <thm15:themeFamily xmlns:thm15="http://schemas.microsoft.com/office/thememl/2012/main" xmlns="" name="Office Theme" id="{62F939B6-93AF-4DB8-9C6B-D6C7DFDC589F}" vid="{4A3C46E8-61CC-4603-A589-7422A47A8E4A}"/>
     </a:ext>
   </a:extLst>
 </a:theme>
@@ -51094,7 +53750,7 @@
   <a:extraClrSchemeLst/>
   <a:extLst>
     <a:ext uri="{05A4C25C-085E-4340-85A3-A5531E510DB2}">
-      <thm15:themeFamily xmlns="" xmlns:thm15="http://schemas.microsoft.com/office/thememl/2012/main" name="Office Theme" id="{62F939B6-93AF-4DB8-9C6B-D6C7DFDC589F}" vid="{4A3C46E8-61CC-4603-A589-7422A47A8E4A}"/>
+      <thm15:themeFamily xmlns:thm15="http://schemas.microsoft.com/office/thememl/2012/main" xmlns="" name="Office Theme" id="{62F939B6-93AF-4DB8-9C6B-D6C7DFDC589F}" vid="{4A3C46E8-61CC-4603-A589-7422A47A8E4A}"/>
     </a:ext>
   </a:extLst>
 </a:theme>

</xml_diff>